<commit_message>
Final commit for simulation itself, I think. Made a few cahnges to the powerpoint and will do results now
</commit_message>
<xml_diff>
--- a/1538_Powerpoint.pptx
+++ b/1538_Powerpoint.pptx
@@ -11,10 +11,11 @@
     <p:sldId id="258" r:id="rId5"/>
     <p:sldId id="259" r:id="rId6"/>
     <p:sldId id="260" r:id="rId7"/>
-    <p:sldId id="261" r:id="rId8"/>
-    <p:sldId id="266" r:id="rId9"/>
-    <p:sldId id="263" r:id="rId10"/>
-    <p:sldId id="264" r:id="rId11"/>
+    <p:sldId id="267" r:id="rId8"/>
+    <p:sldId id="261" r:id="rId9"/>
+    <p:sldId id="266" r:id="rId10"/>
+    <p:sldId id="263" r:id="rId11"/>
+    <p:sldId id="264" r:id="rId12"/>
   </p:sldIdLst>
   <p:sldSz cx="12192000" cy="6858000"/>
   <p:notesSz cx="6858000" cy="9144000"/>
@@ -113,6 +114,11 @@
       </a:defRPr>
     </a:lvl9pPr>
   </p:defaultTextStyle>
+  <p:extLst>
+    <p:ext uri="{EFAFB233-063F-42B5-8137-9DF3F51BA10A}">
+      <p15:sldGuideLst xmlns:p15="http://schemas.microsoft.com/office/powerpoint/2012/main"/>
+    </p:ext>
+  </p:extLst>
 </p:presentation>
 </file>
 
@@ -3645,6 +3651,70 @@
               <a:rPr lang="en-US" sz="2000" u="sng" smtClean="0">
                 <a:latin typeface="Berlin Sans FB Demi" panose="020E0802020502020306" pitchFamily="34" charset="0"/>
               </a:rPr>
+              <a:t>Problem Solutions</a:t>
+            </a:r>
+            <a:endParaRPr lang="en-US" sz="2000" smtClean="0">
+              <a:latin typeface="Berlin Sans FB Demi" panose="020E0802020502020306" pitchFamily="34" charset="0"/>
+            </a:endParaRPr>
+          </a:p>
+        </p:txBody>
+      </p:sp>
+    </p:spTree>
+    <p:extLst>
+      <p:ext uri="{BB962C8B-B14F-4D97-AF65-F5344CB8AC3E}">
+        <p14:creationId xmlns:p14="http://schemas.microsoft.com/office/powerpoint/2010/main" val="1635350146"/>
+      </p:ext>
+    </p:extLst>
+  </p:cSld>
+  <p:clrMapOvr>
+    <a:masterClrMapping/>
+  </p:clrMapOvr>
+</p:sld>
+</file>
+
+<file path=ppt/slides/slide11.xml><?xml version="1.0" encoding="utf-8"?>
+<p:sld xmlns:a="http://schemas.openxmlformats.org/drawingml/2006/main" xmlns:r="http://schemas.openxmlformats.org/officeDocument/2006/relationships" xmlns:p="http://schemas.openxmlformats.org/presentationml/2006/main">
+  <p:cSld>
+    <p:spTree>
+      <p:nvGrpSpPr>
+        <p:cNvPr id="1" name=""/>
+        <p:cNvGrpSpPr/>
+        <p:nvPr/>
+      </p:nvGrpSpPr>
+      <p:grpSpPr>
+        <a:xfrm>
+          <a:off x="0" y="0"/>
+          <a:ext cx="0" cy="0"/>
+          <a:chOff x="0" y="0"/>
+          <a:chExt cx="0" cy="0"/>
+        </a:xfrm>
+      </p:grpSpPr>
+      <p:sp>
+        <p:nvSpPr>
+          <p:cNvPr id="4" name="TextBox 3"/>
+          <p:cNvSpPr txBox="1"/>
+          <p:nvPr/>
+        </p:nvSpPr>
+        <p:spPr>
+          <a:xfrm>
+            <a:off x="418014" y="357768"/>
+            <a:ext cx="7299858" cy="400110"/>
+          </a:xfrm>
+          <a:prstGeom prst="rect">
+            <a:avLst/>
+          </a:prstGeom>
+          <a:noFill/>
+        </p:spPr>
+        <p:txBody>
+          <a:bodyPr wrap="square" rtlCol="0">
+            <a:spAutoFit/>
+          </a:bodyPr>
+          <a:lstStyle/>
+          <a:p>
+            <a:r>
+              <a:rPr lang="en-US" sz="2000" u="sng" smtClean="0">
+                <a:latin typeface="Berlin Sans FB Demi" panose="020E0802020502020306" pitchFamily="34" charset="0"/>
+              </a:rPr>
               <a:t>Concluding Remarks</a:t>
             </a:r>
             <a:endParaRPr lang="en-US" sz="2000" smtClean="0">
@@ -3736,15 +3806,7 @@
               <a:srgbClr val="FFFFFF"/>
             </a:contourClr>
           </a:sp3d>
-          <a:extLst>
-            <a:ext uri="{909E8E84-426E-40DD-AFC4-6F175D3DCCD1}">
-              <a14:hiddenFill xmlns:a14="http://schemas.microsoft.com/office/drawing/2010/main">
-                <a:solidFill>
-                  <a:srgbClr val="FFFFFF"/>
-                </a:solidFill>
-              </a14:hiddenFill>
-            </a:ext>
-          </a:extLst>
+          <a:extLst/>
         </p:spPr>
       </p:pic>
       <p:sp>
@@ -3950,10 +4012,6 @@
               </a:rPr>
               <a:t>Improve company profits by decreasing the amount of time cashiers are idle</a:t>
             </a:r>
-            <a:endParaRPr lang="en-US" sz="2000" smtClean="0">
-              <a:latin typeface="Cambria Math" panose="02040503050406030204" pitchFamily="18" charset="0"/>
-              <a:ea typeface="Cambria Math" panose="02040503050406030204" pitchFamily="18" charset="0"/>
-            </a:endParaRPr>
           </a:p>
         </p:txBody>
       </p:sp>
@@ -4030,7 +4088,7 @@
         <p:spPr>
           <a:xfrm>
             <a:off x="513240" y="974679"/>
-            <a:ext cx="8893767" cy="5355312"/>
+            <a:ext cx="8893767" cy="4385816"/>
           </a:xfrm>
           <a:prstGeom prst="rect">
             <a:avLst/>
@@ -4044,32 +4102,56 @@
           <a:lstStyle/>
           <a:p>
             <a:pPr marL="342900" indent="-342900">
+              <a:lnSpc>
+                <a:spcPct val="150000"/>
+              </a:lnSpc>
               <a:buFont typeface="+mj-lt"/>
               <a:buAutoNum type="arabicPeriod"/>
             </a:pPr>
             <a:r>
-              <a:rPr lang="en-US" smtClean="0">
-                <a:latin typeface="Cambria Math" panose="02040503050406030204" pitchFamily="18" charset="0"/>
-                <a:ea typeface="Cambria Math" panose="02040503050406030204" pitchFamily="18" charset="0"/>
-              </a:rPr>
-              <a:t>How many stations should be run by a cashier as opposed to being self-checkout?</a:t>
+              <a:rPr lang="en-US" dirty="0">
+                <a:latin typeface="Cambria Math" panose="02040503050406030204" pitchFamily="18" charset="0"/>
+                <a:ea typeface="Cambria Math" panose="02040503050406030204" pitchFamily="18" charset="0"/>
+              </a:rPr>
+              <a:t>Which results in shorter wait times: cashier or self-checkout?</a:t>
             </a:r>
           </a:p>
           <a:p>
             <a:pPr lvl="1"/>
             <a:r>
-              <a:rPr lang="en-US" i="1" smtClean="0">
-                <a:latin typeface="Cambria Math" panose="02040503050406030204" pitchFamily="18" charset="0"/>
-                <a:ea typeface="Cambria Math" panose="02040503050406030204" pitchFamily="18" charset="0"/>
-              </a:rPr>
-              <a:t>Lowers time spent waiting in line, making customers more happy. If it is found that there should be a higher ratio of self-checkout lanes, the store could save money by not hiring as many employees</a:t>
+              <a:rPr lang="en-US" i="1" dirty="0" smtClean="0">
+                <a:latin typeface="Cambria Math" panose="02040503050406030204" pitchFamily="18" charset="0"/>
+                <a:ea typeface="Cambria Math" panose="02040503050406030204" pitchFamily="18" charset="0"/>
+              </a:rPr>
+              <a:t>Lowers </a:t>
+            </a:r>
+            <a:r>
+              <a:rPr lang="en-US" i="1" dirty="0" smtClean="0">
+                <a:latin typeface="Cambria Math" panose="02040503050406030204" pitchFamily="18" charset="0"/>
+                <a:ea typeface="Cambria Math" panose="02040503050406030204" pitchFamily="18" charset="0"/>
+              </a:rPr>
+              <a:t>time spent waiting in line, making customers more happy. If it is found that </a:t>
+            </a:r>
+            <a:r>
+              <a:rPr lang="en-US" i="1" dirty="0" smtClean="0">
+                <a:latin typeface="Cambria Math" panose="02040503050406030204" pitchFamily="18" charset="0"/>
+                <a:ea typeface="Cambria Math" panose="02040503050406030204" pitchFamily="18" charset="0"/>
+              </a:rPr>
+              <a:t>self-checkout lanes are significantly faster, </a:t>
+            </a:r>
+            <a:r>
+              <a:rPr lang="en-US" i="1" dirty="0" smtClean="0">
+                <a:latin typeface="Cambria Math" panose="02040503050406030204" pitchFamily="18" charset="0"/>
+                <a:ea typeface="Cambria Math" panose="02040503050406030204" pitchFamily="18" charset="0"/>
+              </a:rPr>
+              <a:t>the store could save money by not hiring as many employees</a:t>
             </a:r>
           </a:p>
           <a:p>
             <a:pPr marL="342900" indent="-342900">
               <a:buAutoNum type="arabicPeriod"/>
             </a:pPr>
-            <a:endParaRPr lang="en-US" smtClean="0">
+            <a:endParaRPr lang="en-US" dirty="0" smtClean="0">
               <a:latin typeface="Cambria Math" panose="02040503050406030204" pitchFamily="18" charset="0"/>
               <a:ea typeface="Cambria Math" panose="02040503050406030204" pitchFamily="18" charset="0"/>
             </a:endParaRPr>
@@ -4079,7 +4161,7 @@
               <a:buAutoNum type="arabicPeriod"/>
             </a:pPr>
             <a:r>
-              <a:rPr lang="en-US" smtClean="0">
+              <a:rPr lang="en-US" dirty="0" smtClean="0">
                 <a:latin typeface="Cambria Math" panose="02040503050406030204" pitchFamily="18" charset="0"/>
                 <a:ea typeface="Cambria Math" panose="02040503050406030204" pitchFamily="18" charset="0"/>
               </a:rPr>
@@ -4089,75 +4171,48 @@
           <a:p>
             <a:pPr lvl="1"/>
             <a:r>
-              <a:rPr lang="en-US" i="1" smtClean="0">
-                <a:latin typeface="Cambria Math" panose="02040503050406030204" pitchFamily="18" charset="0"/>
-                <a:ea typeface="Cambria Math" panose="02040503050406030204" pitchFamily="18" charset="0"/>
-              </a:rPr>
-              <a:t>This will find the optimal balance between maximizing speed of service and minimizing cashier idle time</a:t>
-            </a:r>
+              <a:rPr lang="en-US" i="1" dirty="0" smtClean="0">
+                <a:latin typeface="Cambria Math" panose="02040503050406030204" pitchFamily="18" charset="0"/>
+                <a:ea typeface="Cambria Math" panose="02040503050406030204" pitchFamily="18" charset="0"/>
+              </a:rPr>
+              <a:t>This will find the optimal balance between maximizing speed of </a:t>
+            </a:r>
+            <a:r>
+              <a:rPr lang="en-US" i="1" dirty="0" smtClean="0">
+                <a:latin typeface="Cambria Math" panose="02040503050406030204" pitchFamily="18" charset="0"/>
+                <a:ea typeface="Cambria Math" panose="02040503050406030204" pitchFamily="18" charset="0"/>
+              </a:rPr>
+              <a:t>service and diminishing returns  (extra lanes that do not get used as frequently)</a:t>
+            </a:r>
+          </a:p>
+          <a:p>
+            <a:endParaRPr lang="en-US" dirty="0" smtClean="0">
+              <a:latin typeface="Cambria Math" panose="02040503050406030204" pitchFamily="18" charset="0"/>
+              <a:ea typeface="Cambria Math" panose="02040503050406030204" pitchFamily="18" charset="0"/>
+            </a:endParaRPr>
           </a:p>
           <a:p>
             <a:pPr marL="342900" indent="-342900">
               <a:buAutoNum type="arabicPeriod"/>
             </a:pPr>
-            <a:endParaRPr lang="en-US" smtClean="0">
-              <a:latin typeface="Cambria Math" panose="02040503050406030204" pitchFamily="18" charset="0"/>
-              <a:ea typeface="Cambria Math" panose="02040503050406030204" pitchFamily="18" charset="0"/>
-            </a:endParaRPr>
-          </a:p>
-          <a:p>
-            <a:pPr marL="342900" indent="-342900">
-              <a:buAutoNum type="arabicPeriod"/>
-            </a:pPr>
-            <a:r>
-              <a:rPr lang="en-US" smtClean="0">
-                <a:latin typeface="Cambria Math" panose="02040503050406030204" pitchFamily="18" charset="0"/>
-                <a:ea typeface="Cambria Math" panose="02040503050406030204" pitchFamily="18" charset="0"/>
-              </a:rPr>
-              <a:t>How many more lanes are required during rush hour as opposed to normal hours?</a:t>
+            <a:r>
+              <a:rPr lang="en-US" dirty="0" smtClean="0">
+                <a:latin typeface="Cambria Math" panose="02040503050406030204" pitchFamily="18" charset="0"/>
+                <a:ea typeface="Cambria Math" panose="02040503050406030204" pitchFamily="18" charset="0"/>
+              </a:rPr>
+              <a:t>How often does a customer at the self-service station require an employee’s help with a transaction?</a:t>
             </a:r>
           </a:p>
           <a:p>
             <a:pPr lvl="1"/>
             <a:r>
-              <a:rPr lang="en-US" i="1" smtClean="0">
-                <a:latin typeface="Cambria Math" panose="02040503050406030204" pitchFamily="18" charset="0"/>
-                <a:ea typeface="Cambria Math" panose="02040503050406030204" pitchFamily="18" charset="0"/>
-              </a:rPr>
-              <a:t>Improves quality of service during the time of day when the most revenue is generated</a:t>
-            </a:r>
-          </a:p>
-          <a:p>
-            <a:pPr marL="342900" indent="-342900">
-              <a:buAutoNum type="arabicPeriod"/>
-            </a:pPr>
-            <a:endParaRPr lang="en-US" smtClean="0">
-              <a:latin typeface="Cambria Math" panose="02040503050406030204" pitchFamily="18" charset="0"/>
-              <a:ea typeface="Cambria Math" panose="02040503050406030204" pitchFamily="18" charset="0"/>
-            </a:endParaRPr>
-          </a:p>
-          <a:p>
-            <a:pPr marL="342900" indent="-342900">
-              <a:buAutoNum type="arabicPeriod"/>
-            </a:pPr>
-            <a:r>
-              <a:rPr lang="en-US" smtClean="0">
-                <a:latin typeface="Cambria Math" panose="02040503050406030204" pitchFamily="18" charset="0"/>
-                <a:ea typeface="Cambria Math" panose="02040503050406030204" pitchFamily="18" charset="0"/>
-              </a:rPr>
-              <a:t>How often does a customer at the self-service station require an employee’s help with a transaction?</a:t>
-            </a:r>
-          </a:p>
-          <a:p>
-            <a:pPr lvl="1"/>
-            <a:r>
-              <a:rPr lang="en-US" i="1" smtClean="0">
+              <a:rPr lang="en-US" i="1" dirty="0" smtClean="0">
                 <a:latin typeface="Cambria Math" panose="02040503050406030204" pitchFamily="18" charset="0"/>
                 <a:ea typeface="Cambria Math" panose="02040503050406030204" pitchFamily="18" charset="0"/>
               </a:rPr>
               <a:t>The benefit of self-checkout lanes is that a single employee may manage multiple lanes; this benefit is lost if customers spend too much time waiting for an employee to assist them. If this is the case, improving the software in self-checkout lanes or making more lanes cashier-checkout may be necessary</a:t>
             </a:r>
-            <a:endParaRPr lang="en-US" i="1">
+            <a:endParaRPr lang="en-US" i="1" dirty="0">
               <a:latin typeface="Cambria Math" panose="02040503050406030204" pitchFamily="18" charset="0"/>
               <a:ea typeface="Cambria Math" panose="02040503050406030204" pitchFamily="18" charset="0"/>
             </a:endParaRPr>
@@ -4225,8 +4280,8 @@
           </a:p>
         </p:txBody>
       </p:sp>
-      <mc:AlternateContent xmlns:mc="http://schemas.openxmlformats.org/markup-compatibility/2006">
-        <mc:Choice xmlns:a14="http://schemas.microsoft.com/office/drawing/2010/main" Requires="a14">
+      <mc:AlternateContent xmlns:mc="http://schemas.openxmlformats.org/markup-compatibility/2006" xmlns:a14="http://schemas.microsoft.com/office/drawing/2010/main">
+        <mc:Choice Requires="a14">
           <p:sp>
             <p:nvSpPr>
               <p:cNvPr id="5" name="Rectangle 4"/>
@@ -4292,14 +4347,7 @@
                     <a:latin typeface="Cambria Math" panose="02040503050406030204" pitchFamily="18" charset="0"/>
                     <a:ea typeface="Cambria Math" panose="02040503050406030204" pitchFamily="18" charset="0"/>
                   </a:rPr>
-                  <a:t>Average inter-arrival time: </a:t>
-                </a:r>
-                <a:r>
-                  <a:rPr lang="en-US" smtClean="0">
-                    <a:latin typeface="Cambria Math" panose="02040503050406030204" pitchFamily="18" charset="0"/>
-                    <a:ea typeface="Cambria Math" panose="02040503050406030204" pitchFamily="18" charset="0"/>
-                  </a:rPr>
-                  <a:t>22.48319328</a:t>
+                  <a:t>Average inter-arrival time: 22.48319328</a:t>
                 </a:r>
               </a:p>
               <a:p>
@@ -4441,14 +4489,7 @@
                     <a:latin typeface="Cambria Math" panose="02040503050406030204" pitchFamily="18" charset="0"/>
                     <a:ea typeface="Cambria Math" panose="02040503050406030204" pitchFamily="18" charset="0"/>
                   </a:rPr>
-                  <a:t>= </a:t>
-                </a:r>
-                <a:r>
-                  <a:rPr lang="en-US" smtClean="0">
-                    <a:latin typeface="Cambria Math" panose="02040503050406030204" pitchFamily="18" charset="0"/>
-                    <a:ea typeface="Cambria Math" panose="02040503050406030204" pitchFamily="18" charset="0"/>
-                  </a:rPr>
-                  <a:t>0.273311</a:t>
+                  <a:t>= 0.273311</a:t>
                 </a:r>
               </a:p>
               <a:p>
@@ -4504,7 +4545,7 @@
                     <m:f>
                       <m:fPr>
                         <m:ctrlPr>
-                          <a:rPr lang="en-US" smtClean="0">
+                          <a:rPr lang="en-US" i="1" smtClean="0">
                             <a:latin typeface="Cambria Math" panose="02040503050406030204" pitchFamily="18" charset="0"/>
                             <a:ea typeface="Cambria Math" panose="02040503050406030204" pitchFamily="18" charset="0"/>
                           </a:rPr>
@@ -4671,7 +4712,7 @@
             </p:txBody>
           </p:sp>
         </mc:Choice>
-        <mc:Fallback>
+        <mc:Fallback xmlns="">
           <p:sp>
             <p:nvSpPr>
               <p:cNvPr id="5" name="Rectangle 4"/>
@@ -4763,11 +4804,14 @@
           <a:lstStyle/>
           <a:p>
             <a:r>
-              <a:rPr lang="en-US" sz="2000" u="sng" smtClean="0">
+              <a:rPr lang="en-US" sz="2000" u="sng" dirty="0" smtClean="0">
                 <a:latin typeface="Berlin Sans FB Demi" panose="020E0802020502020306" pitchFamily="34" charset="0"/>
               </a:rPr>
-              <a:t>Modelling</a:t>
-            </a:r>
+              <a:t>Modeling</a:t>
+            </a:r>
+            <a:endParaRPr lang="en-US" sz="2000" u="sng" dirty="0" smtClean="0">
+              <a:latin typeface="Berlin Sans FB Demi" panose="020E0802020502020306" pitchFamily="34" charset="0"/>
+            </a:endParaRPr>
           </a:p>
         </p:txBody>
       </p:sp>
@@ -4801,12 +4845,30 @@
               <a:buChar char="•"/>
             </a:pPr>
             <a:r>
-              <a:rPr lang="en-US" smtClean="0">
-                <a:latin typeface="Cambria Math" panose="02040503050406030204" pitchFamily="18" charset="0"/>
-                <a:ea typeface="Cambria Math" panose="02040503050406030204" pitchFamily="18" charset="0"/>
-              </a:rPr>
-              <a:t>Each checkout lane is modelled as a queue</a:t>
-            </a:r>
+              <a:rPr lang="en-US" dirty="0" smtClean="0">
+                <a:latin typeface="Cambria Math" panose="02040503050406030204" pitchFamily="18" charset="0"/>
+                <a:ea typeface="Cambria Math" panose="02040503050406030204" pitchFamily="18" charset="0"/>
+              </a:rPr>
+              <a:t>Each checkout lane is modelled as a </a:t>
+            </a:r>
+            <a:r>
+              <a:rPr lang="en-US" dirty="0" err="1" smtClean="0">
+                <a:latin typeface="Cambria Math" panose="02040503050406030204" pitchFamily="18" charset="0"/>
+                <a:ea typeface="Cambria Math" panose="02040503050406030204" pitchFamily="18" charset="0"/>
+              </a:rPr>
+              <a:t>SimPy</a:t>
+            </a:r>
+            <a:r>
+              <a:rPr lang="en-US" dirty="0" smtClean="0">
+                <a:latin typeface="Cambria Math" panose="02040503050406030204" pitchFamily="18" charset="0"/>
+                <a:ea typeface="Cambria Math" panose="02040503050406030204" pitchFamily="18" charset="0"/>
+              </a:rPr>
+              <a:t> Resource object</a:t>
+            </a:r>
+            <a:endParaRPr lang="en-US" dirty="0" smtClean="0">
+              <a:latin typeface="Cambria Math" panose="02040503050406030204" pitchFamily="18" charset="0"/>
+              <a:ea typeface="Cambria Math" panose="02040503050406030204" pitchFamily="18" charset="0"/>
+            </a:endParaRPr>
           </a:p>
           <a:p>
             <a:pPr marL="742950" lvl="1" indent="-285750">
@@ -4817,12 +4879,16 @@
               <a:buChar char="•"/>
             </a:pPr>
             <a:r>
-              <a:rPr lang="en-US" smtClean="0">
-                <a:latin typeface="Cambria Math" panose="02040503050406030204" pitchFamily="18" charset="0"/>
-                <a:ea typeface="Cambria Math" panose="02040503050406030204" pitchFamily="18" charset="0"/>
-              </a:rPr>
-              <a:t>Each queue operates as FIFO</a:t>
-            </a:r>
+              <a:rPr lang="en-US" dirty="0" smtClean="0">
+                <a:latin typeface="Cambria Math" panose="02040503050406030204" pitchFamily="18" charset="0"/>
+                <a:ea typeface="Cambria Math" panose="02040503050406030204" pitchFamily="18" charset="0"/>
+              </a:rPr>
+              <a:t>Operates in the same way as a FIFO queue</a:t>
+            </a:r>
+            <a:endParaRPr lang="en-US" dirty="0" smtClean="0">
+              <a:latin typeface="Cambria Math" panose="02040503050406030204" pitchFamily="18" charset="0"/>
+              <a:ea typeface="Cambria Math" panose="02040503050406030204" pitchFamily="18" charset="0"/>
+            </a:endParaRPr>
           </a:p>
           <a:p>
             <a:pPr marL="285750" indent="-285750">
@@ -4833,11 +4899,25 @@
               <a:buChar char="•"/>
             </a:pPr>
             <a:r>
-              <a:rPr lang="en-US" smtClean="0">
-                <a:latin typeface="Cambria Math" panose="02040503050406030204" pitchFamily="18" charset="0"/>
-                <a:ea typeface="Cambria Math" panose="02040503050406030204" pitchFamily="18" charset="0"/>
-              </a:rPr>
-              <a:t>Customers must be modelled as well</a:t>
+              <a:rPr lang="en-US" dirty="0" smtClean="0">
+                <a:latin typeface="Cambria Math" panose="02040503050406030204" pitchFamily="18" charset="0"/>
+                <a:ea typeface="Cambria Math" panose="02040503050406030204" pitchFamily="18" charset="0"/>
+              </a:rPr>
+              <a:t>Customers must be </a:t>
+            </a:r>
+            <a:r>
+              <a:rPr lang="en-US" dirty="0" smtClean="0">
+                <a:latin typeface="Cambria Math" panose="02040503050406030204" pitchFamily="18" charset="0"/>
+                <a:ea typeface="Cambria Math" panose="02040503050406030204" pitchFamily="18" charset="0"/>
+              </a:rPr>
+              <a:t>modeled </a:t>
+            </a:r>
+            <a:r>
+              <a:rPr lang="en-US" dirty="0" smtClean="0">
+                <a:latin typeface="Cambria Math" panose="02040503050406030204" pitchFamily="18" charset="0"/>
+                <a:ea typeface="Cambria Math" panose="02040503050406030204" pitchFamily="18" charset="0"/>
+              </a:rPr>
+              <a:t>as well</a:t>
             </a:r>
           </a:p>
           <a:p>
@@ -4849,7 +4929,7 @@
               <a:buChar char="•"/>
             </a:pPr>
             <a:r>
-              <a:rPr lang="en-US" smtClean="0">
+              <a:rPr lang="en-US" dirty="0" smtClean="0">
                 <a:latin typeface="Cambria Math" panose="02040503050406030204" pitchFamily="18" charset="0"/>
                 <a:ea typeface="Cambria Math" panose="02040503050406030204" pitchFamily="18" charset="0"/>
               </a:rPr>
@@ -4865,12 +4945,23 @@
               <a:buChar char="•"/>
             </a:pPr>
             <a:r>
-              <a:rPr lang="en-US" smtClean="0">
-                <a:latin typeface="Cambria Math" panose="02040503050406030204" pitchFamily="18" charset="0"/>
-                <a:ea typeface="Cambria Math" panose="02040503050406030204" pitchFamily="18" charset="0"/>
-              </a:rPr>
-              <a:t>Customers will arrive according to a Poisson distribution</a:t>
-            </a:r>
+              <a:rPr lang="en-US" dirty="0" smtClean="0">
+                <a:latin typeface="Cambria Math" panose="02040503050406030204" pitchFamily="18" charset="0"/>
+                <a:ea typeface="Cambria Math" panose="02040503050406030204" pitchFamily="18" charset="0"/>
+              </a:rPr>
+              <a:t>Customers will arrive according to a </a:t>
+            </a:r>
+            <a:r>
+              <a:rPr lang="en-US" dirty="0" smtClean="0">
+                <a:latin typeface="Cambria Math" panose="02040503050406030204" pitchFamily="18" charset="0"/>
+                <a:ea typeface="Cambria Math" panose="02040503050406030204" pitchFamily="18" charset="0"/>
+              </a:rPr>
+              <a:t>Exponential distribution</a:t>
+            </a:r>
+            <a:endParaRPr lang="en-US" dirty="0" smtClean="0">
+              <a:latin typeface="Cambria Math" panose="02040503050406030204" pitchFamily="18" charset="0"/>
+              <a:ea typeface="Cambria Math" panose="02040503050406030204" pitchFamily="18" charset="0"/>
+            </a:endParaRPr>
           </a:p>
           <a:p>
             <a:pPr marL="285750" indent="-285750">
@@ -4881,11 +4972,25 @@
               <a:buChar char="•"/>
             </a:pPr>
             <a:r>
-              <a:rPr lang="en-US" smtClean="0">
-                <a:latin typeface="Cambria Math" panose="02040503050406030204" pitchFamily="18" charset="0"/>
-                <a:ea typeface="Cambria Math" panose="02040503050406030204" pitchFamily="18" charset="0"/>
-              </a:rPr>
-              <a:t>The speed at which a customer is serviced by a cashier is dependant on the speed of the cashier and the number of items</a:t>
+              <a:rPr lang="en-US" dirty="0" smtClean="0">
+                <a:latin typeface="Cambria Math" panose="02040503050406030204" pitchFamily="18" charset="0"/>
+                <a:ea typeface="Cambria Math" panose="02040503050406030204" pitchFamily="18" charset="0"/>
+              </a:rPr>
+              <a:t>The speed at which a customer is serviced by a cashier is </a:t>
+            </a:r>
+            <a:r>
+              <a:rPr lang="en-US" dirty="0" smtClean="0">
+                <a:latin typeface="Cambria Math" panose="02040503050406030204" pitchFamily="18" charset="0"/>
+                <a:ea typeface="Cambria Math" panose="02040503050406030204" pitchFamily="18" charset="0"/>
+              </a:rPr>
+              <a:t>dependent </a:t>
+            </a:r>
+            <a:r>
+              <a:rPr lang="en-US" dirty="0" smtClean="0">
+                <a:latin typeface="Cambria Math" panose="02040503050406030204" pitchFamily="18" charset="0"/>
+                <a:ea typeface="Cambria Math" panose="02040503050406030204" pitchFamily="18" charset="0"/>
+              </a:rPr>
+              <a:t>on the speed of the cashier and the number of items</a:t>
             </a:r>
           </a:p>
           <a:p>
@@ -4897,7 +5002,7 @@
               <a:buChar char="•"/>
             </a:pPr>
             <a:r>
-              <a:rPr lang="en-US" smtClean="0">
+              <a:rPr lang="en-US" dirty="0" smtClean="0">
                 <a:latin typeface="Cambria Math" panose="02040503050406030204" pitchFamily="18" charset="0"/>
                 <a:ea typeface="Cambria Math" panose="02040503050406030204" pitchFamily="18" charset="0"/>
               </a:rPr>
@@ -4913,7 +5018,7 @@
               <a:buChar char="•"/>
             </a:pPr>
             <a:r>
-              <a:rPr lang="en-US" smtClean="0">
+              <a:rPr lang="en-US" dirty="0" smtClean="0">
                 <a:latin typeface="Cambria Math" panose="02040503050406030204" pitchFamily="18" charset="0"/>
                 <a:ea typeface="Cambria Math" panose="02040503050406030204" pitchFamily="18" charset="0"/>
               </a:rPr>
@@ -4929,7 +5034,7 @@
               <a:buChar char="•"/>
             </a:pPr>
             <a:r>
-              <a:rPr lang="en-US" smtClean="0">
+              <a:rPr lang="en-US" dirty="0" smtClean="0">
                 <a:latin typeface="Cambria Math" panose="02040503050406030204" pitchFamily="18" charset="0"/>
                 <a:ea typeface="Cambria Math" panose="02040503050406030204" pitchFamily="18" charset="0"/>
               </a:rPr>
@@ -4945,7 +5050,7 @@
               <a:buChar char="•"/>
             </a:pPr>
             <a:r>
-              <a:rPr lang="en-US" smtClean="0">
+              <a:rPr lang="en-US" dirty="0" smtClean="0">
                 <a:latin typeface="Cambria Math" panose="02040503050406030204" pitchFamily="18" charset="0"/>
                 <a:ea typeface="Cambria Math" panose="02040503050406030204" pitchFamily="18" charset="0"/>
               </a:rPr>
@@ -5013,15 +5118,7 @@
               <a:srgbClr val="FFFFFF"/>
             </a:contourClr>
           </a:sp3d>
-          <a:extLst>
-            <a:ext uri="{909E8E84-426E-40DD-AFC4-6F175D3DCCD1}">
-              <a14:hiddenFill xmlns:a14="http://schemas.microsoft.com/office/drawing/2010/main">
-                <a:solidFill>
-                  <a:srgbClr val="FFFFFF"/>
-                </a:solidFill>
-              </a14:hiddenFill>
-            </a:ext>
-          </a:extLst>
+          <a:extLst/>
         </p:spPr>
       </p:pic>
     </p:spTree>
@@ -5116,12 +5213,44 @@
               </a:lnSpc>
             </a:pPr>
             <a:r>
-              <a:rPr lang="en-US" smtClean="0">
-                <a:latin typeface="Cambria Math" panose="02040503050406030204" pitchFamily="18" charset="0"/>
-                <a:ea typeface="Cambria Math" panose="02040503050406030204" pitchFamily="18" charset="0"/>
-              </a:rPr>
-              <a:t>We wrote our program in Python, using the SimPy and NumPy libraries</a:t>
-            </a:r>
+              <a:rPr lang="en-US" dirty="0" smtClean="0">
+                <a:latin typeface="Cambria Math" panose="02040503050406030204" pitchFamily="18" charset="0"/>
+                <a:ea typeface="Cambria Math" panose="02040503050406030204" pitchFamily="18" charset="0"/>
+              </a:rPr>
+              <a:t>We wrote our program in Python, using the </a:t>
+            </a:r>
+            <a:r>
+              <a:rPr lang="en-US" dirty="0" err="1" smtClean="0">
+                <a:latin typeface="Cambria Math" panose="02040503050406030204" pitchFamily="18" charset="0"/>
+                <a:ea typeface="Cambria Math" panose="02040503050406030204" pitchFamily="18" charset="0"/>
+              </a:rPr>
+              <a:t>SimPy</a:t>
+            </a:r>
+            <a:r>
+              <a:rPr lang="en-US" dirty="0" smtClean="0">
+                <a:latin typeface="Cambria Math" panose="02040503050406030204" pitchFamily="18" charset="0"/>
+                <a:ea typeface="Cambria Math" panose="02040503050406030204" pitchFamily="18" charset="0"/>
+              </a:rPr>
+              <a:t> and </a:t>
+            </a:r>
+            <a:r>
+              <a:rPr lang="en-US" dirty="0" err="1" smtClean="0">
+                <a:latin typeface="Cambria Math" panose="02040503050406030204" pitchFamily="18" charset="0"/>
+                <a:ea typeface="Cambria Math" panose="02040503050406030204" pitchFamily="18" charset="0"/>
+              </a:rPr>
+              <a:t>SciPy.Stats</a:t>
+            </a:r>
+            <a:r>
+              <a:rPr lang="en-US" dirty="0" smtClean="0">
+                <a:latin typeface="Cambria Math" panose="02040503050406030204" pitchFamily="18" charset="0"/>
+                <a:ea typeface="Cambria Math" panose="02040503050406030204" pitchFamily="18" charset="0"/>
+              </a:rPr>
+              <a:t> libraries</a:t>
+            </a:r>
+            <a:endParaRPr lang="en-US" dirty="0" smtClean="0">
+              <a:latin typeface="Cambria Math" panose="02040503050406030204" pitchFamily="18" charset="0"/>
+              <a:ea typeface="Cambria Math" panose="02040503050406030204" pitchFamily="18" charset="0"/>
+            </a:endParaRPr>
           </a:p>
           <a:p>
             <a:pPr>
@@ -5130,7 +5259,7 @@
               </a:lnSpc>
             </a:pPr>
             <a:r>
-              <a:rPr lang="en-US" smtClean="0">
+              <a:rPr lang="en-US" dirty="0" smtClean="0">
                 <a:latin typeface="Cambria Math" panose="02040503050406030204" pitchFamily="18" charset="0"/>
                 <a:ea typeface="Cambria Math" panose="02040503050406030204" pitchFamily="18" charset="0"/>
               </a:rPr>
@@ -5146,12 +5275,23 @@
               <a:buChar char="•"/>
             </a:pPr>
             <a:r>
-              <a:rPr lang="en-US" smtClean="0">
-                <a:latin typeface="Cambria Math" panose="02040503050406030204" pitchFamily="18" charset="0"/>
-                <a:ea typeface="Cambria Math" panose="02040503050406030204" pitchFamily="18" charset="0"/>
-              </a:rPr>
-              <a:t>The amount of cashier-checkout lanes and self-checkout lanes will be easily modifiable</a:t>
-            </a:r>
+              <a:rPr lang="en-US" dirty="0" smtClean="0">
+                <a:latin typeface="Cambria Math" panose="02040503050406030204" pitchFamily="18" charset="0"/>
+                <a:ea typeface="Cambria Math" panose="02040503050406030204" pitchFamily="18" charset="0"/>
+              </a:rPr>
+              <a:t>The amount of cashier-checkout lanes and self-checkout lanes </a:t>
+            </a:r>
+            <a:r>
+              <a:rPr lang="en-US" dirty="0" smtClean="0">
+                <a:latin typeface="Cambria Math" panose="02040503050406030204" pitchFamily="18" charset="0"/>
+                <a:ea typeface="Cambria Math" panose="02040503050406030204" pitchFamily="18" charset="0"/>
+              </a:rPr>
+              <a:t>are easily modifiable through  command-line arguments</a:t>
+            </a:r>
+            <a:endParaRPr lang="en-US" dirty="0" smtClean="0">
+              <a:latin typeface="Cambria Math" panose="02040503050406030204" pitchFamily="18" charset="0"/>
+              <a:ea typeface="Cambria Math" panose="02040503050406030204" pitchFamily="18" charset="0"/>
+            </a:endParaRPr>
           </a:p>
           <a:p>
             <a:pPr marL="285750" indent="-285750">
@@ -5162,12 +5302,23 @@
               <a:buChar char="•"/>
             </a:pPr>
             <a:r>
-              <a:rPr lang="en-US" smtClean="0">
-                <a:latin typeface="Cambria Math" panose="02040503050406030204" pitchFamily="18" charset="0"/>
-                <a:ea typeface="Cambria Math" panose="02040503050406030204" pitchFamily="18" charset="0"/>
-              </a:rPr>
-              <a:t>Customers will arrive in a pseudo-random fashion following a poisson distribution</a:t>
-            </a:r>
+              <a:rPr lang="en-US" dirty="0" smtClean="0">
+                <a:latin typeface="Cambria Math" panose="02040503050406030204" pitchFamily="18" charset="0"/>
+                <a:ea typeface="Cambria Math" panose="02040503050406030204" pitchFamily="18" charset="0"/>
+              </a:rPr>
+              <a:t>Customers will arrive in a pseudo-random fashion following a </a:t>
+            </a:r>
+            <a:r>
+              <a:rPr lang="en-US" dirty="0" smtClean="0">
+                <a:latin typeface="Cambria Math" panose="02040503050406030204" pitchFamily="18" charset="0"/>
+                <a:ea typeface="Cambria Math" panose="02040503050406030204" pitchFamily="18" charset="0"/>
+              </a:rPr>
+              <a:t>Exponential distribution</a:t>
+            </a:r>
+            <a:endParaRPr lang="en-US" dirty="0" smtClean="0">
+              <a:latin typeface="Cambria Math" panose="02040503050406030204" pitchFamily="18" charset="0"/>
+              <a:ea typeface="Cambria Math" panose="02040503050406030204" pitchFamily="18" charset="0"/>
+            </a:endParaRPr>
           </a:p>
           <a:p>
             <a:pPr marL="285750" indent="-285750">
@@ -5178,12 +5329,39 @@
               <a:buChar char="•"/>
             </a:pPr>
             <a:r>
-              <a:rPr lang="en-US" smtClean="0">
-                <a:latin typeface="Cambria Math" panose="02040503050406030204" pitchFamily="18" charset="0"/>
-                <a:ea typeface="Cambria Math" panose="02040503050406030204" pitchFamily="18" charset="0"/>
-              </a:rPr>
-              <a:t>Customers will choose to go to either a self-checkout or cashier-checkout lane and go to the shortest queue for that category</a:t>
-            </a:r>
+              <a:rPr lang="en-US" dirty="0">
+                <a:latin typeface="Cambria Math" panose="02040503050406030204" pitchFamily="18" charset="0"/>
+                <a:ea typeface="Cambria Math" panose="02040503050406030204" pitchFamily="18" charset="0"/>
+              </a:rPr>
+              <a:t>Each customer will have a randomly generated number of items they are </a:t>
+            </a:r>
+            <a:r>
+              <a:rPr lang="en-US" dirty="0" smtClean="0">
+                <a:latin typeface="Cambria Math" panose="02040503050406030204" pitchFamily="18" charset="0"/>
+                <a:ea typeface="Cambria Math" panose="02040503050406030204" pitchFamily="18" charset="0"/>
+              </a:rPr>
+              <a:t>purchasing</a:t>
+            </a:r>
+          </a:p>
+          <a:p>
+            <a:pPr marL="742950" lvl="1" indent="-285750">
+              <a:lnSpc>
+                <a:spcPct val="150000"/>
+              </a:lnSpc>
+              <a:buFont typeface="Arial" panose="020B0604020202020204" pitchFamily="34" charset="0"/>
+              <a:buChar char="•"/>
+            </a:pPr>
+            <a:r>
+              <a:rPr lang="en-US" dirty="0" smtClean="0">
+                <a:latin typeface="Cambria Math" panose="02040503050406030204" pitchFamily="18" charset="0"/>
+                <a:ea typeface="Cambria Math" panose="02040503050406030204" pitchFamily="18" charset="0"/>
+              </a:rPr>
+              <a:t>Number of items is normally distributed</a:t>
+            </a:r>
+            <a:endParaRPr lang="en-US" dirty="0">
+              <a:latin typeface="Cambria Math" panose="02040503050406030204" pitchFamily="18" charset="0"/>
+              <a:ea typeface="Cambria Math" panose="02040503050406030204" pitchFamily="18" charset="0"/>
+            </a:endParaRPr>
           </a:p>
           <a:p>
             <a:pPr marL="285750" indent="-285750">
@@ -5194,11 +5372,41 @@
               <a:buChar char="•"/>
             </a:pPr>
             <a:r>
-              <a:rPr lang="en-US" smtClean="0">
-                <a:latin typeface="Cambria Math" panose="02040503050406030204" pitchFamily="18" charset="0"/>
-                <a:ea typeface="Cambria Math" panose="02040503050406030204" pitchFamily="18" charset="0"/>
-              </a:rPr>
-              <a:t>Each customer will have a randomly generated number of items they are purchasing</a:t>
+              <a:rPr lang="en-US" dirty="0" smtClean="0">
+                <a:latin typeface="Cambria Math" panose="02040503050406030204" pitchFamily="18" charset="0"/>
+                <a:ea typeface="Cambria Math" panose="02040503050406030204" pitchFamily="18" charset="0"/>
+              </a:rPr>
+              <a:t>Customers </a:t>
+            </a:r>
+            <a:r>
+              <a:rPr lang="en-US" dirty="0" smtClean="0">
+                <a:latin typeface="Cambria Math" panose="02040503050406030204" pitchFamily="18" charset="0"/>
+                <a:ea typeface="Cambria Math" panose="02040503050406030204" pitchFamily="18" charset="0"/>
+              </a:rPr>
+              <a:t>will choose to go to either a self-checkout or cashier-checkout lane </a:t>
+            </a:r>
+            <a:r>
+              <a:rPr lang="en-US" dirty="0" smtClean="0">
+                <a:latin typeface="Cambria Math" panose="02040503050406030204" pitchFamily="18" charset="0"/>
+                <a:ea typeface="Cambria Math" panose="02040503050406030204" pitchFamily="18" charset="0"/>
+              </a:rPr>
+              <a:t>based on the number of items they have</a:t>
+            </a:r>
+          </a:p>
+          <a:p>
+            <a:pPr marL="742950" lvl="1" indent="-285750">
+              <a:lnSpc>
+                <a:spcPct val="150000"/>
+              </a:lnSpc>
+              <a:buFont typeface="Arial" panose="020B0604020202020204" pitchFamily="34" charset="0"/>
+              <a:buChar char="•"/>
+            </a:pPr>
+            <a:r>
+              <a:rPr lang="en-US" dirty="0" smtClean="0">
+                <a:latin typeface="Cambria Math" panose="02040503050406030204" pitchFamily="18" charset="0"/>
+                <a:ea typeface="Cambria Math" panose="02040503050406030204" pitchFamily="18" charset="0"/>
+              </a:rPr>
+              <a:t>Customers are much more likely to use the self-checkout lanes if they have few items (usually ≤10)</a:t>
             </a:r>
           </a:p>
           <a:p>
@@ -5209,45 +5417,10 @@
               <a:buFont typeface="Arial" panose="020B0604020202020204" pitchFamily="34" charset="0"/>
               <a:buChar char="•"/>
             </a:pPr>
-            <a:r>
-              <a:rPr lang="en-US" smtClean="0">
-                <a:latin typeface="Cambria Math" panose="02040503050406030204" pitchFamily="18" charset="0"/>
-                <a:ea typeface="Cambria Math" panose="02040503050406030204" pitchFamily="18" charset="0"/>
-              </a:rPr>
-              <a:t>Service rates between self-checkout and cashier-checkout will differ</a:t>
-            </a:r>
-          </a:p>
-          <a:p>
-            <a:pPr marL="285750" indent="-285750">
-              <a:lnSpc>
-                <a:spcPct val="150000"/>
-              </a:lnSpc>
-              <a:buFont typeface="Arial" panose="020B0604020202020204" pitchFamily="34" charset="0"/>
-              <a:buChar char="•"/>
-            </a:pPr>
-            <a:r>
-              <a:rPr lang="en-US" smtClean="0">
-                <a:latin typeface="Cambria Math" panose="02040503050406030204" pitchFamily="18" charset="0"/>
-                <a:ea typeface="Cambria Math" panose="02040503050406030204" pitchFamily="18" charset="0"/>
-              </a:rPr>
-              <a:t>After a certain amount of time, output the total wait time, number of items, and number of employee interventions in self-checkout</a:t>
-            </a:r>
-          </a:p>
-          <a:p>
-            <a:pPr marL="285750" indent="-285750">
-              <a:lnSpc>
-                <a:spcPct val="150000"/>
-              </a:lnSpc>
-              <a:buFont typeface="Arial" panose="020B0604020202020204" pitchFamily="34" charset="0"/>
-              <a:buChar char="•"/>
-            </a:pPr>
-            <a:r>
-              <a:rPr lang="en-US" smtClean="0">
-                <a:latin typeface="Cambria Math" panose="02040503050406030204" pitchFamily="18" charset="0"/>
-                <a:ea typeface="Cambria Math" panose="02040503050406030204" pitchFamily="18" charset="0"/>
-              </a:rPr>
-              <a:t>The simulation will be run multiple times with varying amount of self-checkout lanes and cashier lanes</a:t>
-            </a:r>
+            <a:endParaRPr lang="en-US" dirty="0" smtClean="0">
+              <a:latin typeface="Cambria Math" panose="02040503050406030204" pitchFamily="18" charset="0"/>
+              <a:ea typeface="Cambria Math" panose="02040503050406030204" pitchFamily="18" charset="0"/>
+            </a:endParaRPr>
           </a:p>
         </p:txBody>
       </p:sp>
@@ -5307,84 +5480,24 @@
               <a:rPr lang="en-US" sz="2000" u="sng" smtClean="0">
                 <a:latin typeface="Berlin Sans FB Demi" panose="020E0802020502020306" pitchFamily="34" charset="0"/>
               </a:rPr>
-              <a:t>Experiments</a:t>
-            </a:r>
-            <a:r>
-              <a:rPr lang="en-US" sz="2000" smtClean="0">
-                <a:latin typeface="Berlin Sans FB Demi" panose="020E0802020502020306" pitchFamily="34" charset="0"/>
-              </a:rPr>
-              <a:t> (1)</a:t>
-            </a:r>
-          </a:p>
-        </p:txBody>
-      </p:sp>
-      <p:sp>
-        <p:nvSpPr>
-          <p:cNvPr id="5" name="Rectangle 4"/>
-          <p:cNvSpPr/>
+              <a:t>Experimental Design</a:t>
+            </a:r>
+            <a:endParaRPr lang="en-US" sz="2000" smtClean="0">
+              <a:latin typeface="Berlin Sans FB Demi" panose="020E0802020502020306" pitchFamily="34" charset="0"/>
+            </a:endParaRPr>
+          </a:p>
+        </p:txBody>
+      </p:sp>
+      <p:sp>
+        <p:nvSpPr>
+          <p:cNvPr id="5" name="TextBox 4"/>
+          <p:cNvSpPr txBox="1"/>
           <p:nvPr/>
         </p:nvSpPr>
         <p:spPr>
           <a:xfrm>
-            <a:off x="782594" y="1172512"/>
-            <a:ext cx="8806249" cy="923330"/>
-          </a:xfrm>
-          <a:prstGeom prst="rect">
-            <a:avLst/>
-          </a:prstGeom>
-        </p:spPr>
-        <p:txBody>
-          <a:bodyPr wrap="square">
-            <a:spAutoFit/>
-          </a:bodyPr>
-          <a:lstStyle/>
-          <a:p>
-            <a:pPr marL="342900" indent="-342900">
-              <a:lnSpc>
-                <a:spcPct val="150000"/>
-              </a:lnSpc>
-              <a:buFont typeface="+mj-lt"/>
-              <a:buAutoNum type="arabicPeriod"/>
-            </a:pPr>
-            <a:r>
-              <a:rPr lang="en-US" i="1" smtClean="0">
-                <a:latin typeface="Cambria Math" panose="02040503050406030204" pitchFamily="18" charset="0"/>
-                <a:ea typeface="Cambria Math" panose="02040503050406030204" pitchFamily="18" charset="0"/>
-              </a:rPr>
-              <a:t>How many stations should be run by a cashier as opposed to being self-checkout?</a:t>
-            </a:r>
-          </a:p>
-          <a:p>
-            <a:pPr marL="342900" indent="-342900">
-              <a:lnSpc>
-                <a:spcPct val="150000"/>
-              </a:lnSpc>
-              <a:buAutoNum type="arabicPeriod"/>
-            </a:pPr>
-            <a:r>
-              <a:rPr lang="en-US" i="1" smtClean="0">
-                <a:latin typeface="Cambria Math" panose="02040503050406030204" pitchFamily="18" charset="0"/>
-                <a:ea typeface="Cambria Math" panose="02040503050406030204" pitchFamily="18" charset="0"/>
-              </a:rPr>
-              <a:t>What are the optimal number of lanes to have open on an average day?</a:t>
-            </a:r>
-            <a:endParaRPr lang="en-US" i="1" smtClean="0">
-              <a:latin typeface="Cambria Math" panose="02040503050406030204" pitchFamily="18" charset="0"/>
-              <a:ea typeface="Cambria Math" panose="02040503050406030204" pitchFamily="18" charset="0"/>
-            </a:endParaRPr>
-          </a:p>
-        </p:txBody>
-      </p:sp>
-      <p:sp>
-        <p:nvSpPr>
-          <p:cNvPr id="6" name="TextBox 5"/>
-          <p:cNvSpPr txBox="1"/>
-          <p:nvPr/>
-        </p:nvSpPr>
-        <p:spPr>
-          <a:xfrm>
-            <a:off x="570905" y="2342160"/>
-            <a:ext cx="10064143" cy="923330"/>
+            <a:off x="677997" y="1007630"/>
+            <a:ext cx="10064143" cy="3000821"/>
           </a:xfrm>
           <a:prstGeom prst="rect">
             <a:avLst/>
@@ -5397,101 +5510,94 @@
           </a:bodyPr>
           <a:lstStyle/>
           <a:p>
-            <a:pPr>
+            <a:pPr marL="285750" indent="-285750">
               <a:lnSpc>
                 <a:spcPct val="150000"/>
               </a:lnSpc>
+              <a:buFont typeface="Arial" panose="020B0604020202020204" pitchFamily="34" charset="0"/>
+              <a:buChar char="•"/>
             </a:pPr>
             <a:r>
-              <a:rPr lang="en-US" smtClean="0">
-                <a:latin typeface="Cambria Math" panose="02040503050406030204" pitchFamily="18" charset="0"/>
-                <a:ea typeface="Cambria Math" panose="02040503050406030204" pitchFamily="18" charset="0"/>
-              </a:rPr>
-              <a:t>The pseudo-random arrival will be the same for different combinations of checkout stations. For these two problems, we can use a paired t-test to find the significance of our results </a:t>
-            </a:r>
-          </a:p>
-        </p:txBody>
-      </p:sp>
-      <p:sp>
-        <p:nvSpPr>
-          <p:cNvPr id="7" name="Rectangle 6"/>
-          <p:cNvSpPr/>
-          <p:nvPr/>
-        </p:nvSpPr>
-        <p:spPr>
-          <a:xfrm>
-            <a:off x="782593" y="3493013"/>
-            <a:ext cx="8806249" cy="369332"/>
-          </a:xfrm>
-          <a:prstGeom prst="rect">
-            <a:avLst/>
-          </a:prstGeom>
-        </p:spPr>
-        <p:txBody>
-          <a:bodyPr wrap="square">
-            <a:spAutoFit/>
-          </a:bodyPr>
-          <a:lstStyle/>
-          <a:p>
-            <a:pPr marL="342900" indent="-342900">
-              <a:buFont typeface="+mj-lt"/>
-              <a:buAutoNum type="arabicPeriod" startAt="3"/>
+              <a:rPr lang="en-US" dirty="0" smtClean="0">
+                <a:latin typeface="Cambria Math" panose="02040503050406030204" pitchFamily="18" charset="0"/>
+                <a:ea typeface="Cambria Math" panose="02040503050406030204" pitchFamily="18" charset="0"/>
+              </a:rPr>
+              <a:t>Customers using self-checkout have a personal service rate (assigned when created) while cashier lanes have a constant rate throughout the day </a:t>
+            </a:r>
+          </a:p>
+          <a:p>
+            <a:pPr marL="742950" lvl="1" indent="-285750">
+              <a:lnSpc>
+                <a:spcPct val="150000"/>
+              </a:lnSpc>
+              <a:buFont typeface="Arial" panose="020B0604020202020204" pitchFamily="34" charset="0"/>
+              <a:buChar char="•"/>
             </a:pPr>
             <a:r>
-              <a:rPr lang="en-US" i="1" smtClean="0">
-                <a:latin typeface="Cambria Math" panose="02040503050406030204" pitchFamily="18" charset="0"/>
-                <a:ea typeface="Cambria Math" panose="02040503050406030204" pitchFamily="18" charset="0"/>
-              </a:rPr>
-              <a:t>How many more lanes are required during rush hour as opposed to normal hours?</a:t>
-            </a:r>
-            <a:endParaRPr lang="en-US" i="1" smtClean="0">
+              <a:rPr lang="en-US" dirty="0" smtClean="0">
+                <a:latin typeface="Cambria Math" panose="02040503050406030204" pitchFamily="18" charset="0"/>
+                <a:ea typeface="Cambria Math" panose="02040503050406030204" pitchFamily="18" charset="0"/>
+              </a:rPr>
+              <a:t>Checkout speeds for cashiers and customers are exponentially </a:t>
+            </a:r>
+            <a:r>
+              <a:rPr lang="en-US" dirty="0" err="1" smtClean="0">
+                <a:latin typeface="Cambria Math" panose="02040503050406030204" pitchFamily="18" charset="0"/>
+                <a:ea typeface="Cambria Math" panose="02040503050406030204" pitchFamily="18" charset="0"/>
+              </a:rPr>
+              <a:t>distrubuted</a:t>
+            </a:r>
+            <a:endParaRPr lang="en-US" dirty="0" smtClean="0">
               <a:latin typeface="Cambria Math" panose="02040503050406030204" pitchFamily="18" charset="0"/>
               <a:ea typeface="Cambria Math" panose="02040503050406030204" pitchFamily="18" charset="0"/>
             </a:endParaRPr>
           </a:p>
-        </p:txBody>
-      </p:sp>
-      <p:sp>
-        <p:nvSpPr>
-          <p:cNvPr id="8" name="TextBox 7"/>
-          <p:cNvSpPr txBox="1"/>
-          <p:nvPr/>
-        </p:nvSpPr>
-        <p:spPr>
-          <a:xfrm>
-            <a:off x="570905" y="4089868"/>
-            <a:ext cx="10064143" cy="923330"/>
-          </a:xfrm>
-          <a:prstGeom prst="rect">
-            <a:avLst/>
-          </a:prstGeom>
-          <a:noFill/>
-        </p:spPr>
-        <p:txBody>
-          <a:bodyPr wrap="square" rtlCol="0">
-            <a:spAutoFit/>
-          </a:bodyPr>
-          <a:lstStyle/>
-          <a:p>
-            <a:pPr>
+          <a:p>
+            <a:pPr marL="285750" indent="-285750">
               <a:lnSpc>
                 <a:spcPct val="150000"/>
               </a:lnSpc>
+              <a:buFont typeface="Arial" panose="020B0604020202020204" pitchFamily="34" charset="0"/>
+              <a:buChar char="•"/>
             </a:pPr>
             <a:r>
-              <a:rPr lang="en-US" smtClean="0">
-                <a:latin typeface="Cambria Math" panose="02040503050406030204" pitchFamily="18" charset="0"/>
-                <a:ea typeface="Cambria Math" panose="02040503050406030204" pitchFamily="18" charset="0"/>
-              </a:rPr>
-              <a:t>Once we have the answer to problem #2, we can compare the service results of the simulations to find which has the most comparibly efficient service.</a:t>
-            </a:r>
+              <a:rPr lang="en-US" dirty="0" smtClean="0">
+                <a:latin typeface="Cambria Math" panose="02040503050406030204" pitchFamily="18" charset="0"/>
+                <a:ea typeface="Cambria Math" panose="02040503050406030204" pitchFamily="18" charset="0"/>
+              </a:rPr>
+              <a:t>The simulation runs for 10 “hours” and outputs each customer’s checkout stats into a spreadsheet when they complete</a:t>
+            </a:r>
+            <a:endParaRPr lang="en-US" dirty="0" smtClean="0">
+              <a:latin typeface="Cambria Math" panose="02040503050406030204" pitchFamily="18" charset="0"/>
+              <a:ea typeface="Cambria Math" panose="02040503050406030204" pitchFamily="18" charset="0"/>
+            </a:endParaRPr>
+          </a:p>
+          <a:p>
+            <a:pPr marL="285750" indent="-285750">
+              <a:lnSpc>
+                <a:spcPct val="150000"/>
+              </a:lnSpc>
+              <a:buFont typeface="Arial" panose="020B0604020202020204" pitchFamily="34" charset="0"/>
+              <a:buChar char="•"/>
+            </a:pPr>
+            <a:r>
+              <a:rPr lang="en-US" dirty="0" smtClean="0">
+                <a:latin typeface="Cambria Math" panose="02040503050406030204" pitchFamily="18" charset="0"/>
+                <a:ea typeface="Cambria Math" panose="02040503050406030204" pitchFamily="18" charset="0"/>
+              </a:rPr>
+              <a:t>The simulation will be run multiple times with varying amount of self-checkout lanes and cashier lanes</a:t>
+            </a:r>
+            <a:endParaRPr lang="en-US" dirty="0" smtClean="0">
+              <a:latin typeface="Cambria Math" panose="02040503050406030204" pitchFamily="18" charset="0"/>
+              <a:ea typeface="Cambria Math" panose="02040503050406030204" pitchFamily="18" charset="0"/>
+            </a:endParaRPr>
           </a:p>
         </p:txBody>
       </p:sp>
     </p:spTree>
     <p:extLst>
       <p:ext uri="{BB962C8B-B14F-4D97-AF65-F5344CB8AC3E}">
-        <p14:creationId xmlns:p14="http://schemas.microsoft.com/office/powerpoint/2010/main" val="1678888948"/>
+        <p14:creationId xmlns:p14="http://schemas.microsoft.com/office/powerpoint/2010/main" val="775383950"/>
       </p:ext>
     </p:extLst>
   </p:cSld>
@@ -5550,6 +5656,268 @@
               <a:rPr lang="en-US" sz="2000" smtClean="0">
                 <a:latin typeface="Berlin Sans FB Demi" panose="020E0802020502020306" pitchFamily="34" charset="0"/>
               </a:rPr>
+              <a:t> (1)</a:t>
+            </a:r>
+          </a:p>
+        </p:txBody>
+      </p:sp>
+      <p:sp>
+        <p:nvSpPr>
+          <p:cNvPr id="5" name="Rectangle 4"/>
+          <p:cNvSpPr/>
+          <p:nvPr/>
+        </p:nvSpPr>
+        <p:spPr>
+          <a:xfrm>
+            <a:off x="782594" y="1172512"/>
+            <a:ext cx="8806249" cy="456472"/>
+          </a:xfrm>
+          <a:prstGeom prst="rect">
+            <a:avLst/>
+          </a:prstGeom>
+        </p:spPr>
+        <p:txBody>
+          <a:bodyPr wrap="square">
+            <a:spAutoFit/>
+          </a:bodyPr>
+          <a:lstStyle/>
+          <a:p>
+            <a:pPr marL="342900" indent="-342900">
+              <a:lnSpc>
+                <a:spcPct val="150000"/>
+              </a:lnSpc>
+              <a:buFont typeface="+mj-lt"/>
+              <a:buAutoNum type="arabicPeriod"/>
+            </a:pPr>
+            <a:r>
+              <a:rPr lang="en-US" i="1" dirty="0" smtClean="0">
+                <a:latin typeface="Cambria Math" panose="02040503050406030204" pitchFamily="18" charset="0"/>
+                <a:ea typeface="Cambria Math" panose="02040503050406030204" pitchFamily="18" charset="0"/>
+              </a:rPr>
+              <a:t>Which results in shorte</a:t>
+            </a:r>
+            <a:r>
+              <a:rPr lang="en-US" i="1" dirty="0" smtClean="0">
+                <a:latin typeface="Cambria Math" panose="02040503050406030204" pitchFamily="18" charset="0"/>
+                <a:ea typeface="Cambria Math" panose="02040503050406030204" pitchFamily="18" charset="0"/>
+              </a:rPr>
+              <a:t>r wait times: cashier or self-checkout?</a:t>
+            </a:r>
+            <a:endParaRPr lang="en-US" i="1" dirty="0" smtClean="0">
+              <a:latin typeface="Cambria Math" panose="02040503050406030204" pitchFamily="18" charset="0"/>
+              <a:ea typeface="Cambria Math" panose="02040503050406030204" pitchFamily="18" charset="0"/>
+            </a:endParaRPr>
+          </a:p>
+        </p:txBody>
+      </p:sp>
+      <p:sp>
+        <p:nvSpPr>
+          <p:cNvPr id="6" name="TextBox 5"/>
+          <p:cNvSpPr txBox="1"/>
+          <p:nvPr/>
+        </p:nvSpPr>
+        <p:spPr>
+          <a:xfrm>
+            <a:off x="1489729" y="4331480"/>
+            <a:ext cx="9807537" cy="1338828"/>
+          </a:xfrm>
+          <a:prstGeom prst="rect">
+            <a:avLst/>
+          </a:prstGeom>
+          <a:noFill/>
+        </p:spPr>
+        <p:txBody>
+          <a:bodyPr wrap="square" rtlCol="0">
+            <a:spAutoFit/>
+          </a:bodyPr>
+          <a:lstStyle/>
+          <a:p>
+            <a:pPr>
+              <a:lnSpc>
+                <a:spcPct val="150000"/>
+              </a:lnSpc>
+            </a:pPr>
+            <a:r>
+              <a:rPr lang="en-US" dirty="0" smtClean="0">
+                <a:latin typeface="Cambria Math" panose="02040503050406030204" pitchFamily="18" charset="0"/>
+                <a:ea typeface="Cambria Math" panose="02040503050406030204" pitchFamily="18" charset="0"/>
+              </a:rPr>
+              <a:t>Since there are multiple combinations of self-checkout and cashier kiosks, we can’t do a paired t-test. Instead, we will run the simulation for a “week” with each combination—the one with the best wait and service times is the optimal combination </a:t>
+            </a:r>
+            <a:endParaRPr lang="en-US" dirty="0" smtClean="0">
+              <a:latin typeface="Cambria Math" panose="02040503050406030204" pitchFamily="18" charset="0"/>
+              <a:ea typeface="Cambria Math" panose="02040503050406030204" pitchFamily="18" charset="0"/>
+            </a:endParaRPr>
+          </a:p>
+        </p:txBody>
+      </p:sp>
+      <p:sp>
+        <p:nvSpPr>
+          <p:cNvPr id="9" name="Rectangle 8"/>
+          <p:cNvSpPr/>
+          <p:nvPr/>
+        </p:nvSpPr>
+        <p:spPr>
+          <a:xfrm>
+            <a:off x="782593" y="3511808"/>
+            <a:ext cx="8806249" cy="456472"/>
+          </a:xfrm>
+          <a:prstGeom prst="rect">
+            <a:avLst/>
+          </a:prstGeom>
+        </p:spPr>
+        <p:txBody>
+          <a:bodyPr wrap="square">
+            <a:spAutoFit/>
+          </a:bodyPr>
+          <a:lstStyle/>
+          <a:p>
+            <a:pPr>
+              <a:lnSpc>
+                <a:spcPct val="150000"/>
+              </a:lnSpc>
+            </a:pPr>
+            <a:r>
+              <a:rPr lang="en-US" i="1" dirty="0" smtClean="0">
+                <a:latin typeface="Cambria Math" panose="02040503050406030204" pitchFamily="18" charset="0"/>
+                <a:ea typeface="Cambria Math" panose="02040503050406030204" pitchFamily="18" charset="0"/>
+              </a:rPr>
+              <a:t>2.   What is the </a:t>
+            </a:r>
+            <a:r>
+              <a:rPr lang="en-US" i="1" dirty="0" smtClean="0">
+                <a:latin typeface="Cambria Math" panose="02040503050406030204" pitchFamily="18" charset="0"/>
+                <a:ea typeface="Cambria Math" panose="02040503050406030204" pitchFamily="18" charset="0"/>
+              </a:rPr>
+              <a:t>optimal number of </a:t>
+            </a:r>
+            <a:r>
+              <a:rPr lang="en-US" i="1" dirty="0" smtClean="0">
+                <a:latin typeface="Cambria Math" panose="02040503050406030204" pitchFamily="18" charset="0"/>
+                <a:ea typeface="Cambria Math" panose="02040503050406030204" pitchFamily="18" charset="0"/>
+              </a:rPr>
+              <a:t>lanes  (of each type) to </a:t>
+            </a:r>
+            <a:r>
+              <a:rPr lang="en-US" i="1" dirty="0" smtClean="0">
+                <a:latin typeface="Cambria Math" panose="02040503050406030204" pitchFamily="18" charset="0"/>
+                <a:ea typeface="Cambria Math" panose="02040503050406030204" pitchFamily="18" charset="0"/>
+              </a:rPr>
+              <a:t>have open on an average day?</a:t>
+            </a:r>
+          </a:p>
+        </p:txBody>
+      </p:sp>
+      <p:sp>
+        <p:nvSpPr>
+          <p:cNvPr id="10" name="TextBox 9"/>
+          <p:cNvSpPr txBox="1"/>
+          <p:nvPr/>
+        </p:nvSpPr>
+        <p:spPr>
+          <a:xfrm>
+            <a:off x="1489730" y="2108731"/>
+            <a:ext cx="9807536" cy="1338828"/>
+          </a:xfrm>
+          <a:prstGeom prst="rect">
+            <a:avLst/>
+          </a:prstGeom>
+          <a:noFill/>
+        </p:spPr>
+        <p:txBody>
+          <a:bodyPr wrap="square" rtlCol="0">
+            <a:spAutoFit/>
+          </a:bodyPr>
+          <a:lstStyle/>
+          <a:p>
+            <a:pPr>
+              <a:lnSpc>
+                <a:spcPct val="150000"/>
+              </a:lnSpc>
+            </a:pPr>
+            <a:r>
+              <a:rPr lang="en-US" dirty="0" smtClean="0">
+                <a:latin typeface="Cambria Math" panose="02040503050406030204" pitchFamily="18" charset="0"/>
+                <a:ea typeface="Cambria Math" panose="02040503050406030204" pitchFamily="18" charset="0"/>
+              </a:rPr>
+              <a:t>The pseudo-random arrival will be the same for different combinations of checkout stations. For </a:t>
+            </a:r>
+            <a:r>
+              <a:rPr lang="en-US" dirty="0" smtClean="0">
+                <a:latin typeface="Cambria Math" panose="02040503050406030204" pitchFamily="18" charset="0"/>
+                <a:ea typeface="Cambria Math" panose="02040503050406030204" pitchFamily="18" charset="0"/>
+              </a:rPr>
+              <a:t>this problem we run the simulation for a “week” once with one cashier, once with one self-checkout, and do a paired t-test on the resulting wait times.</a:t>
+            </a:r>
+            <a:endParaRPr lang="en-US" dirty="0" smtClean="0">
+              <a:latin typeface="Cambria Math" panose="02040503050406030204" pitchFamily="18" charset="0"/>
+              <a:ea typeface="Cambria Math" panose="02040503050406030204" pitchFamily="18" charset="0"/>
+            </a:endParaRPr>
+          </a:p>
+        </p:txBody>
+      </p:sp>
+    </p:spTree>
+    <p:extLst>
+      <p:ext uri="{BB962C8B-B14F-4D97-AF65-F5344CB8AC3E}">
+        <p14:creationId xmlns:p14="http://schemas.microsoft.com/office/powerpoint/2010/main" val="1678888948"/>
+      </p:ext>
+    </p:extLst>
+  </p:cSld>
+  <p:clrMapOvr>
+    <a:masterClrMapping/>
+  </p:clrMapOvr>
+</p:sld>
+</file>
+
+<file path=ppt/slides/slide9.xml><?xml version="1.0" encoding="utf-8"?>
+<p:sld xmlns:a="http://schemas.openxmlformats.org/drawingml/2006/main" xmlns:r="http://schemas.openxmlformats.org/officeDocument/2006/relationships" xmlns:p="http://schemas.openxmlformats.org/presentationml/2006/main">
+  <p:cSld>
+    <p:spTree>
+      <p:nvGrpSpPr>
+        <p:cNvPr id="1" name=""/>
+        <p:cNvGrpSpPr/>
+        <p:nvPr/>
+      </p:nvGrpSpPr>
+      <p:grpSpPr>
+        <a:xfrm>
+          <a:off x="0" y="0"/>
+          <a:ext cx="0" cy="0"/>
+          <a:chOff x="0" y="0"/>
+          <a:chExt cx="0" cy="0"/>
+        </a:xfrm>
+      </p:grpSpPr>
+      <p:sp>
+        <p:nvSpPr>
+          <p:cNvPr id="4" name="TextBox 3"/>
+          <p:cNvSpPr txBox="1"/>
+          <p:nvPr/>
+        </p:nvSpPr>
+        <p:spPr>
+          <a:xfrm>
+            <a:off x="418014" y="357768"/>
+            <a:ext cx="7299858" cy="400110"/>
+          </a:xfrm>
+          <a:prstGeom prst="rect">
+            <a:avLst/>
+          </a:prstGeom>
+          <a:noFill/>
+        </p:spPr>
+        <p:txBody>
+          <a:bodyPr wrap="square" rtlCol="0">
+            <a:spAutoFit/>
+          </a:bodyPr>
+          <a:lstStyle/>
+          <a:p>
+            <a:r>
+              <a:rPr lang="en-US" sz="2000" u="sng" smtClean="0">
+                <a:latin typeface="Berlin Sans FB Demi" panose="020E0802020502020306" pitchFamily="34" charset="0"/>
+              </a:rPr>
+              <a:t>Experiments</a:t>
+            </a:r>
+            <a:r>
+              <a:rPr lang="en-US" sz="2000" smtClean="0">
+                <a:latin typeface="Berlin Sans FB Demi" panose="020E0802020502020306" pitchFamily="34" charset="0"/>
+              </a:rPr>
               <a:t> (2)</a:t>
             </a:r>
           </a:p>
@@ -5576,16 +5944,19 @@
           </a:bodyPr>
           <a:lstStyle/>
           <a:p>
-            <a:pPr marL="342900" indent="-342900">
-              <a:buFont typeface="+mj-lt"/>
-              <a:buAutoNum type="arabicPeriod" startAt="4"/>
-            </a:pPr>
-            <a:r>
-              <a:rPr lang="en-US" i="1" smtClean="0">
-                <a:latin typeface="Cambria Math" panose="02040503050406030204" pitchFamily="18" charset="0"/>
-                <a:ea typeface="Cambria Math" panose="02040503050406030204" pitchFamily="18" charset="0"/>
-              </a:rPr>
-              <a:t>How often does a customer at the self-service station require an employee’s help with a transaction?</a:t>
+            <a:r>
+              <a:rPr lang="en-US" i="1" dirty="0" smtClean="0">
+                <a:latin typeface="Cambria Math" panose="02040503050406030204" pitchFamily="18" charset="0"/>
+                <a:ea typeface="Cambria Math" panose="02040503050406030204" pitchFamily="18" charset="0"/>
+              </a:rPr>
+              <a:t>3.   How </a:t>
+            </a:r>
+            <a:r>
+              <a:rPr lang="en-US" i="1" dirty="0" smtClean="0">
+                <a:latin typeface="Cambria Math" panose="02040503050406030204" pitchFamily="18" charset="0"/>
+                <a:ea typeface="Cambria Math" panose="02040503050406030204" pitchFamily="18" charset="0"/>
+              </a:rPr>
+              <a:t>often does a customer at the self-service station require an employee’s help with a transaction?</a:t>
             </a:r>
           </a:p>
         </p:txBody>
@@ -5599,7 +5970,7 @@
         <p:spPr>
           <a:xfrm>
             <a:off x="570904" y="2233477"/>
-            <a:ext cx="10064143" cy="923330"/>
+            <a:ext cx="10064143" cy="871970"/>
           </a:xfrm>
           <a:prstGeom prst="rect">
             <a:avLst/>
@@ -5618,12 +5989,37 @@
               </a:lnSpc>
             </a:pPr>
             <a:r>
-              <a:rPr lang="en-US" smtClean="0">
-                <a:latin typeface="Cambria Math" panose="02040503050406030204" pitchFamily="18" charset="0"/>
-                <a:ea typeface="Cambria Math" panose="02040503050406030204" pitchFamily="18" charset="0"/>
-              </a:rPr>
-              <a:t>We can easily figure this out by running our simulation and determining the average time it takes to deal with an employee intervention</a:t>
-            </a:r>
+              <a:rPr lang="en-US" dirty="0" smtClean="0">
+                <a:latin typeface="Cambria Math" panose="02040503050406030204" pitchFamily="18" charset="0"/>
+                <a:ea typeface="Cambria Math" panose="02040503050406030204" pitchFamily="18" charset="0"/>
+              </a:rPr>
+              <a:t>We can easily figure this out by running our </a:t>
+            </a:r>
+            <a:r>
+              <a:rPr lang="en-US" dirty="0" smtClean="0">
+                <a:latin typeface="Cambria Math" panose="02040503050406030204" pitchFamily="18" charset="0"/>
+                <a:ea typeface="Cambria Math" panose="02040503050406030204" pitchFamily="18" charset="0"/>
+              </a:rPr>
+              <a:t>simulation for several “days” </a:t>
+            </a:r>
+            <a:r>
+              <a:rPr lang="en-US" dirty="0" smtClean="0">
+                <a:latin typeface="Cambria Math" panose="02040503050406030204" pitchFamily="18" charset="0"/>
+                <a:ea typeface="Cambria Math" panose="02040503050406030204" pitchFamily="18" charset="0"/>
+              </a:rPr>
+              <a:t>and </a:t>
+            </a:r>
+            <a:r>
+              <a:rPr lang="en-US" dirty="0" smtClean="0">
+                <a:latin typeface="Cambria Math" panose="02040503050406030204" pitchFamily="18" charset="0"/>
+                <a:ea typeface="Cambria Math" panose="02040503050406030204" pitchFamily="18" charset="0"/>
+              </a:rPr>
+              <a:t>counting the average number of employee interactions/day</a:t>
+            </a:r>
+            <a:endParaRPr lang="en-US" dirty="0" smtClean="0">
+              <a:latin typeface="Cambria Math" panose="02040503050406030204" pitchFamily="18" charset="0"/>
+              <a:ea typeface="Cambria Math" panose="02040503050406030204" pitchFamily="18" charset="0"/>
+            </a:endParaRPr>
           </a:p>
         </p:txBody>
       </p:sp>
@@ -5686,85 +6082,13 @@
               <a:srgbClr val="FFFFFF"/>
             </a:contourClr>
           </a:sp3d>
-          <a:extLst>
-            <a:ext uri="{909E8E84-426E-40DD-AFC4-6F175D3DCCD1}">
-              <a14:hiddenFill xmlns:a14="http://schemas.microsoft.com/office/drawing/2010/main">
-                <a:solidFill>
-                  <a:srgbClr val="FFFFFF"/>
-                </a:solidFill>
-              </a14:hiddenFill>
-            </a:ext>
-          </a:extLst>
+          <a:extLst/>
         </p:spPr>
       </p:pic>
     </p:spTree>
     <p:extLst>
       <p:ext uri="{BB962C8B-B14F-4D97-AF65-F5344CB8AC3E}">
         <p14:creationId xmlns:p14="http://schemas.microsoft.com/office/powerpoint/2010/main" val="3038857847"/>
-      </p:ext>
-    </p:extLst>
-  </p:cSld>
-  <p:clrMapOvr>
-    <a:masterClrMapping/>
-  </p:clrMapOvr>
-</p:sld>
-</file>
-
-<file path=ppt/slides/slide9.xml><?xml version="1.0" encoding="utf-8"?>
-<p:sld xmlns:a="http://schemas.openxmlformats.org/drawingml/2006/main" xmlns:r="http://schemas.openxmlformats.org/officeDocument/2006/relationships" xmlns:p="http://schemas.openxmlformats.org/presentationml/2006/main">
-  <p:cSld>
-    <p:spTree>
-      <p:nvGrpSpPr>
-        <p:cNvPr id="1" name=""/>
-        <p:cNvGrpSpPr/>
-        <p:nvPr/>
-      </p:nvGrpSpPr>
-      <p:grpSpPr>
-        <a:xfrm>
-          <a:off x="0" y="0"/>
-          <a:ext cx="0" cy="0"/>
-          <a:chOff x="0" y="0"/>
-          <a:chExt cx="0" cy="0"/>
-        </a:xfrm>
-      </p:grpSpPr>
-      <p:sp>
-        <p:nvSpPr>
-          <p:cNvPr id="4" name="TextBox 3"/>
-          <p:cNvSpPr txBox="1"/>
-          <p:nvPr/>
-        </p:nvSpPr>
-        <p:spPr>
-          <a:xfrm>
-            <a:off x="418014" y="357768"/>
-            <a:ext cx="7299858" cy="400110"/>
-          </a:xfrm>
-          <a:prstGeom prst="rect">
-            <a:avLst/>
-          </a:prstGeom>
-          <a:noFill/>
-        </p:spPr>
-        <p:txBody>
-          <a:bodyPr wrap="square" rtlCol="0">
-            <a:spAutoFit/>
-          </a:bodyPr>
-          <a:lstStyle/>
-          <a:p>
-            <a:r>
-              <a:rPr lang="en-US" sz="2000" u="sng" smtClean="0">
-                <a:latin typeface="Berlin Sans FB Demi" panose="020E0802020502020306" pitchFamily="34" charset="0"/>
-              </a:rPr>
-              <a:t>Problem Solutions</a:t>
-            </a:r>
-            <a:endParaRPr lang="en-US" sz="2000" smtClean="0">
-              <a:latin typeface="Berlin Sans FB Demi" panose="020E0802020502020306" pitchFamily="34" charset="0"/>
-            </a:endParaRPr>
-          </a:p>
-        </p:txBody>
-      </p:sp>
-    </p:spTree>
-    <p:extLst>
-      <p:ext uri="{BB962C8B-B14F-4D97-AF65-F5344CB8AC3E}">
-        <p14:creationId xmlns:p14="http://schemas.microsoft.com/office/powerpoint/2010/main" val="1635350146"/>
       </p:ext>
     </p:extLst>
   </p:cSld>

</xml_diff>

<commit_message>
Forgot to add a little thing to the Powerpoint
</commit_message>
<xml_diff>
--- a/1538_Powerpoint.pptx
+++ b/1538_Powerpoint.pptx
@@ -4123,28 +4123,7 @@
                 <a:latin typeface="Cambria Math" panose="02040503050406030204" pitchFamily="18" charset="0"/>
                 <a:ea typeface="Cambria Math" panose="02040503050406030204" pitchFamily="18" charset="0"/>
               </a:rPr>
-              <a:t>Lowers </a:t>
-            </a:r>
-            <a:r>
-              <a:rPr lang="en-US" i="1" dirty="0" smtClean="0">
-                <a:latin typeface="Cambria Math" panose="02040503050406030204" pitchFamily="18" charset="0"/>
-                <a:ea typeface="Cambria Math" panose="02040503050406030204" pitchFamily="18" charset="0"/>
-              </a:rPr>
-              <a:t>time spent waiting in line, making customers more happy. If it is found that </a:t>
-            </a:r>
-            <a:r>
-              <a:rPr lang="en-US" i="1" dirty="0" smtClean="0">
-                <a:latin typeface="Cambria Math" panose="02040503050406030204" pitchFamily="18" charset="0"/>
-                <a:ea typeface="Cambria Math" panose="02040503050406030204" pitchFamily="18" charset="0"/>
-              </a:rPr>
-              <a:t>self-checkout lanes are significantly faster, </a:t>
-            </a:r>
-            <a:r>
-              <a:rPr lang="en-US" i="1" dirty="0" smtClean="0">
-                <a:latin typeface="Cambria Math" panose="02040503050406030204" pitchFamily="18" charset="0"/>
-                <a:ea typeface="Cambria Math" panose="02040503050406030204" pitchFamily="18" charset="0"/>
-              </a:rPr>
-              <a:t>the store could save money by not hiring as many employees</a:t>
+              <a:t>Lowers time spent waiting in line, making customers more happy. If it is found that self-checkout lanes are significantly faster, the store could save money by not hiring as many employees</a:t>
             </a:r>
           </a:p>
           <a:p>
@@ -4175,14 +4154,7 @@
                 <a:latin typeface="Cambria Math" panose="02040503050406030204" pitchFamily="18" charset="0"/>
                 <a:ea typeface="Cambria Math" panose="02040503050406030204" pitchFamily="18" charset="0"/>
               </a:rPr>
-              <a:t>This will find the optimal balance between maximizing speed of </a:t>
-            </a:r>
-            <a:r>
-              <a:rPr lang="en-US" i="1" dirty="0" smtClean="0">
-                <a:latin typeface="Cambria Math" panose="02040503050406030204" pitchFamily="18" charset="0"/>
-                <a:ea typeface="Cambria Math" panose="02040503050406030204" pitchFamily="18" charset="0"/>
-              </a:rPr>
-              <a:t>service and diminishing returns  (extra lanes that do not get used as frequently)</a:t>
+              <a:t>This will find the optimal balance between maximizing speed of service and diminishing returns  (extra lanes that do not get used as frequently)</a:t>
             </a:r>
           </a:p>
           <a:p>
@@ -4809,9 +4781,6 @@
               </a:rPr>
               <a:t>Modeling</a:t>
             </a:r>
-            <a:endParaRPr lang="en-US" sz="2000" u="sng" dirty="0" smtClean="0">
-              <a:latin typeface="Berlin Sans FB Demi" panose="020E0802020502020306" pitchFamily="34" charset="0"/>
-            </a:endParaRPr>
           </a:p>
         </p:txBody>
       </p:sp>
@@ -4865,10 +4834,6 @@
               </a:rPr>
               <a:t> Resource object</a:t>
             </a:r>
-            <a:endParaRPr lang="en-US" dirty="0" smtClean="0">
-              <a:latin typeface="Cambria Math" panose="02040503050406030204" pitchFamily="18" charset="0"/>
-              <a:ea typeface="Cambria Math" panose="02040503050406030204" pitchFamily="18" charset="0"/>
-            </a:endParaRPr>
           </a:p>
           <a:p>
             <a:pPr marL="742950" lvl="1" indent="-285750">
@@ -4885,10 +4850,6 @@
               </a:rPr>
               <a:t>Operates in the same way as a FIFO queue</a:t>
             </a:r>
-            <a:endParaRPr lang="en-US" dirty="0" smtClean="0">
-              <a:latin typeface="Cambria Math" panose="02040503050406030204" pitchFamily="18" charset="0"/>
-              <a:ea typeface="Cambria Math" panose="02040503050406030204" pitchFamily="18" charset="0"/>
-            </a:endParaRPr>
           </a:p>
           <a:p>
             <a:pPr marL="285750" indent="-285750">
@@ -4903,21 +4864,7 @@
                 <a:latin typeface="Cambria Math" panose="02040503050406030204" pitchFamily="18" charset="0"/>
                 <a:ea typeface="Cambria Math" panose="02040503050406030204" pitchFamily="18" charset="0"/>
               </a:rPr>
-              <a:t>Customers must be </a:t>
-            </a:r>
-            <a:r>
-              <a:rPr lang="en-US" dirty="0" smtClean="0">
-                <a:latin typeface="Cambria Math" panose="02040503050406030204" pitchFamily="18" charset="0"/>
-                <a:ea typeface="Cambria Math" panose="02040503050406030204" pitchFamily="18" charset="0"/>
-              </a:rPr>
-              <a:t>modeled </a:t>
-            </a:r>
-            <a:r>
-              <a:rPr lang="en-US" dirty="0" smtClean="0">
-                <a:latin typeface="Cambria Math" panose="02040503050406030204" pitchFamily="18" charset="0"/>
-                <a:ea typeface="Cambria Math" panose="02040503050406030204" pitchFamily="18" charset="0"/>
-              </a:rPr>
-              <a:t>as well</a:t>
+              <a:t>Customers must be modeled as well</a:t>
             </a:r>
           </a:p>
           <a:p>
@@ -4949,19 +4896,8 @@
                 <a:latin typeface="Cambria Math" panose="02040503050406030204" pitchFamily="18" charset="0"/>
                 <a:ea typeface="Cambria Math" panose="02040503050406030204" pitchFamily="18" charset="0"/>
               </a:rPr>
-              <a:t>Customers will arrive according to a </a:t>
-            </a:r>
-            <a:r>
-              <a:rPr lang="en-US" dirty="0" smtClean="0">
-                <a:latin typeface="Cambria Math" panose="02040503050406030204" pitchFamily="18" charset="0"/>
-                <a:ea typeface="Cambria Math" panose="02040503050406030204" pitchFamily="18" charset="0"/>
-              </a:rPr>
-              <a:t>Exponential distribution</a:t>
-            </a:r>
-            <a:endParaRPr lang="en-US" dirty="0" smtClean="0">
-              <a:latin typeface="Cambria Math" panose="02040503050406030204" pitchFamily="18" charset="0"/>
-              <a:ea typeface="Cambria Math" panose="02040503050406030204" pitchFamily="18" charset="0"/>
-            </a:endParaRPr>
+              <a:t>Customers will arrive according to a Exponential distribution</a:t>
+            </a:r>
           </a:p>
           <a:p>
             <a:pPr marL="285750" indent="-285750">
@@ -4976,21 +4912,7 @@
                 <a:latin typeface="Cambria Math" panose="02040503050406030204" pitchFamily="18" charset="0"/>
                 <a:ea typeface="Cambria Math" panose="02040503050406030204" pitchFamily="18" charset="0"/>
               </a:rPr>
-              <a:t>The speed at which a customer is serviced by a cashier is </a:t>
-            </a:r>
-            <a:r>
-              <a:rPr lang="en-US" dirty="0" smtClean="0">
-                <a:latin typeface="Cambria Math" panose="02040503050406030204" pitchFamily="18" charset="0"/>
-                <a:ea typeface="Cambria Math" panose="02040503050406030204" pitchFamily="18" charset="0"/>
-              </a:rPr>
-              <a:t>dependent </a:t>
-            </a:r>
-            <a:r>
-              <a:rPr lang="en-US" dirty="0" smtClean="0">
-                <a:latin typeface="Cambria Math" panose="02040503050406030204" pitchFamily="18" charset="0"/>
-                <a:ea typeface="Cambria Math" panose="02040503050406030204" pitchFamily="18" charset="0"/>
-              </a:rPr>
-              <a:t>on the speed of the cashier and the number of items</a:t>
+              <a:t>The speed at which a customer is serviced by a cashier is dependent on the speed of the cashier and the number of items</a:t>
             </a:r>
           </a:p>
           <a:p>
@@ -5194,7 +5116,7 @@
         <p:spPr>
           <a:xfrm>
             <a:off x="677997" y="1007630"/>
-            <a:ext cx="10064143" cy="5078313"/>
+            <a:ext cx="10064143" cy="5909310"/>
           </a:xfrm>
           <a:prstGeom prst="rect">
             <a:avLst/>
@@ -5247,10 +5169,6 @@
               </a:rPr>
               <a:t> libraries</a:t>
             </a:r>
-            <a:endParaRPr lang="en-US" dirty="0" smtClean="0">
-              <a:latin typeface="Cambria Math" panose="02040503050406030204" pitchFamily="18" charset="0"/>
-              <a:ea typeface="Cambria Math" panose="02040503050406030204" pitchFamily="18" charset="0"/>
-            </a:endParaRPr>
           </a:p>
           <a:p>
             <a:pPr>
@@ -5279,14 +5197,30 @@
                 <a:latin typeface="Cambria Math" panose="02040503050406030204" pitchFamily="18" charset="0"/>
                 <a:ea typeface="Cambria Math" panose="02040503050406030204" pitchFamily="18" charset="0"/>
               </a:rPr>
-              <a:t>The amount of cashier-checkout lanes and self-checkout lanes </a:t>
+              <a:t>The amount of cashier-checkout lanes and self-checkout lanes are easily modifiable through  command-line </a:t>
             </a:r>
             <a:r>
               <a:rPr lang="en-US" dirty="0" smtClean="0">
                 <a:latin typeface="Cambria Math" panose="02040503050406030204" pitchFamily="18" charset="0"/>
                 <a:ea typeface="Cambria Math" panose="02040503050406030204" pitchFamily="18" charset="0"/>
               </a:rPr>
-              <a:t>are easily modifiable through  command-line arguments</a:t>
+              <a:t>arguments</a:t>
+            </a:r>
+          </a:p>
+          <a:p>
+            <a:pPr marL="742950" lvl="1" indent="-285750">
+              <a:lnSpc>
+                <a:spcPct val="150000"/>
+              </a:lnSpc>
+              <a:buFont typeface="Arial" panose="020B0604020202020204" pitchFamily="34" charset="0"/>
+              <a:buChar char="•"/>
+            </a:pPr>
+            <a:r>
+              <a:rPr lang="en-US" dirty="0" smtClean="0">
+                <a:latin typeface="Cambria Math" panose="02040503050406030204" pitchFamily="18" charset="0"/>
+                <a:ea typeface="Cambria Math" panose="02040503050406030204" pitchFamily="18" charset="0"/>
+              </a:rPr>
+              <a:t>The number of 10-hour days the sim runs for can also be changed on the command line (default is 1)</a:t>
             </a:r>
             <a:endParaRPr lang="en-US" dirty="0" smtClean="0">
               <a:latin typeface="Cambria Math" panose="02040503050406030204" pitchFamily="18" charset="0"/>
@@ -5306,19 +5240,8 @@
                 <a:latin typeface="Cambria Math" panose="02040503050406030204" pitchFamily="18" charset="0"/>
                 <a:ea typeface="Cambria Math" panose="02040503050406030204" pitchFamily="18" charset="0"/>
               </a:rPr>
-              <a:t>Customers will arrive in a pseudo-random fashion following a </a:t>
-            </a:r>
-            <a:r>
-              <a:rPr lang="en-US" dirty="0" smtClean="0">
-                <a:latin typeface="Cambria Math" panose="02040503050406030204" pitchFamily="18" charset="0"/>
-                <a:ea typeface="Cambria Math" panose="02040503050406030204" pitchFamily="18" charset="0"/>
-              </a:rPr>
-              <a:t>Exponential distribution</a:t>
-            </a:r>
-            <a:endParaRPr lang="en-US" dirty="0" smtClean="0">
-              <a:latin typeface="Cambria Math" panose="02040503050406030204" pitchFamily="18" charset="0"/>
-              <a:ea typeface="Cambria Math" panose="02040503050406030204" pitchFamily="18" charset="0"/>
-            </a:endParaRPr>
+              <a:t>Customers will arrive in a pseudo-random fashion following a Exponential distribution</a:t>
+            </a:r>
           </a:p>
           <a:p>
             <a:pPr marL="285750" indent="-285750">
@@ -5376,21 +5299,7 @@
                 <a:latin typeface="Cambria Math" panose="02040503050406030204" pitchFamily="18" charset="0"/>
                 <a:ea typeface="Cambria Math" panose="02040503050406030204" pitchFamily="18" charset="0"/>
               </a:rPr>
-              <a:t>Customers </a:t>
-            </a:r>
-            <a:r>
-              <a:rPr lang="en-US" dirty="0" smtClean="0">
-                <a:latin typeface="Cambria Math" panose="02040503050406030204" pitchFamily="18" charset="0"/>
-                <a:ea typeface="Cambria Math" panose="02040503050406030204" pitchFamily="18" charset="0"/>
-              </a:rPr>
-              <a:t>will choose to go to either a self-checkout or cashier-checkout lane </a:t>
-            </a:r>
-            <a:r>
-              <a:rPr lang="en-US" dirty="0" smtClean="0">
-                <a:latin typeface="Cambria Math" panose="02040503050406030204" pitchFamily="18" charset="0"/>
-                <a:ea typeface="Cambria Math" panose="02040503050406030204" pitchFamily="18" charset="0"/>
-              </a:rPr>
-              <a:t>based on the number of items they have</a:t>
+              <a:t>Customers will choose to go to either a self-checkout or cashier-checkout lane based on the number of items they have</a:t>
             </a:r>
           </a:p>
           <a:p>
@@ -5497,7 +5406,7 @@
         <p:spPr>
           <a:xfrm>
             <a:off x="677997" y="1007630"/>
-            <a:ext cx="10064143" cy="3000821"/>
+            <a:ext cx="10064143" cy="3831818"/>
           </a:xfrm>
           <a:prstGeom prst="rect">
             <a:avLst/>
@@ -5565,7 +5474,51 @@
                 <a:latin typeface="Cambria Math" panose="02040503050406030204" pitchFamily="18" charset="0"/>
                 <a:ea typeface="Cambria Math" panose="02040503050406030204" pitchFamily="18" charset="0"/>
               </a:rPr>
-              <a:t>The simulation runs for 10 “hours” and outputs each customer’s checkout stats into a spreadsheet when they complete</a:t>
+              <a:t>The simulation runs for 10 “hours</a:t>
+            </a:r>
+            <a:r>
+              <a:rPr lang="en-US" dirty="0" smtClean="0">
+                <a:latin typeface="Cambria Math" panose="02040503050406030204" pitchFamily="18" charset="0"/>
+                <a:ea typeface="Cambria Math" panose="02040503050406030204" pitchFamily="18" charset="0"/>
+              </a:rPr>
+              <a:t>” (times the number of </a:t>
+            </a:r>
+            <a:r>
+              <a:rPr lang="en-US" smtClean="0">
+                <a:latin typeface="Cambria Math" panose="02040503050406030204" pitchFamily="18" charset="0"/>
+                <a:ea typeface="Cambria Math" panose="02040503050406030204" pitchFamily="18" charset="0"/>
+              </a:rPr>
+              <a:t>user-specified days)  </a:t>
+            </a:r>
+            <a:r>
+              <a:rPr lang="en-US" dirty="0" smtClean="0">
+                <a:latin typeface="Cambria Math" panose="02040503050406030204" pitchFamily="18" charset="0"/>
+                <a:ea typeface="Cambria Math" panose="02040503050406030204" pitchFamily="18" charset="0"/>
+              </a:rPr>
+              <a:t>and outputs each customer’s checkout stats into a spreadsheet when they </a:t>
+            </a:r>
+            <a:r>
+              <a:rPr lang="en-US" dirty="0" smtClean="0">
+                <a:latin typeface="Cambria Math" panose="02040503050406030204" pitchFamily="18" charset="0"/>
+                <a:ea typeface="Cambria Math" panose="02040503050406030204" pitchFamily="18" charset="0"/>
+              </a:rPr>
+              <a:t>complete</a:t>
+            </a:r>
+          </a:p>
+          <a:p>
+            <a:pPr marL="742950" lvl="1" indent="-285750">
+              <a:lnSpc>
+                <a:spcPct val="150000"/>
+              </a:lnSpc>
+              <a:buFont typeface="Arial" panose="020B0604020202020204" pitchFamily="34" charset="0"/>
+              <a:buChar char="•"/>
+            </a:pPr>
+            <a:r>
+              <a:rPr lang="en-US" dirty="0" smtClean="0">
+                <a:latin typeface="Cambria Math" panose="02040503050406030204" pitchFamily="18" charset="0"/>
+                <a:ea typeface="Cambria Math" panose="02040503050406030204" pitchFamily="18" charset="0"/>
+              </a:rPr>
+              <a:t>ID, # items, type of kiosk, kiosk number, time spent in line, time spent checking out, whether or not an employee was involved (if self-checkout was used)</a:t>
             </a:r>
             <a:endParaRPr lang="en-US" dirty="0" smtClean="0">
               <a:latin typeface="Cambria Math" panose="02040503050406030204" pitchFamily="18" charset="0"/>
@@ -5585,12 +5538,29 @@
                 <a:latin typeface="Cambria Math" panose="02040503050406030204" pitchFamily="18" charset="0"/>
                 <a:ea typeface="Cambria Math" panose="02040503050406030204" pitchFamily="18" charset="0"/>
               </a:rPr>
-              <a:t>The simulation will be run multiple times with varying amount of self-checkout lanes and cashier lanes</a:t>
-            </a:r>
-            <a:endParaRPr lang="en-US" dirty="0" smtClean="0">
-              <a:latin typeface="Cambria Math" panose="02040503050406030204" pitchFamily="18" charset="0"/>
-              <a:ea typeface="Cambria Math" panose="02040503050406030204" pitchFamily="18" charset="0"/>
-            </a:endParaRPr>
+              <a:t>The simulation will be run multiple times with </a:t>
+            </a:r>
+            <a:r>
+              <a:rPr lang="en-US" dirty="0" smtClean="0">
+                <a:latin typeface="Cambria Math" panose="02040503050406030204" pitchFamily="18" charset="0"/>
+                <a:ea typeface="Cambria Math" panose="02040503050406030204" pitchFamily="18" charset="0"/>
+              </a:rPr>
+              <a:t>different combinations of </a:t>
+            </a:r>
+            <a:r>
+              <a:rPr lang="en-US" dirty="0" smtClean="0">
+                <a:latin typeface="Cambria Math" panose="02040503050406030204" pitchFamily="18" charset="0"/>
+                <a:ea typeface="Cambria Math" panose="02040503050406030204" pitchFamily="18" charset="0"/>
+              </a:rPr>
+              <a:t>self-checkout lanes and cashier </a:t>
+            </a:r>
+            <a:r>
+              <a:rPr lang="en-US" dirty="0" smtClean="0">
+                <a:latin typeface="Cambria Math" panose="02040503050406030204" pitchFamily="18" charset="0"/>
+                <a:ea typeface="Cambria Math" panose="02040503050406030204" pitchFamily="18" charset="0"/>
+              </a:rPr>
+              <a:t>lanes</a:t>
+            </a:r>
           </a:p>
         </p:txBody>
       </p:sp>
@@ -5694,19 +5664,8 @@
                 <a:latin typeface="Cambria Math" panose="02040503050406030204" pitchFamily="18" charset="0"/>
                 <a:ea typeface="Cambria Math" panose="02040503050406030204" pitchFamily="18" charset="0"/>
               </a:rPr>
-              <a:t>Which results in shorte</a:t>
-            </a:r>
-            <a:r>
-              <a:rPr lang="en-US" i="1" dirty="0" smtClean="0">
-                <a:latin typeface="Cambria Math" panose="02040503050406030204" pitchFamily="18" charset="0"/>
-                <a:ea typeface="Cambria Math" panose="02040503050406030204" pitchFamily="18" charset="0"/>
-              </a:rPr>
-              <a:t>r wait times: cashier or self-checkout?</a:t>
-            </a:r>
-            <a:endParaRPr lang="en-US" i="1" dirty="0" smtClean="0">
-              <a:latin typeface="Cambria Math" panose="02040503050406030204" pitchFamily="18" charset="0"/>
-              <a:ea typeface="Cambria Math" panose="02040503050406030204" pitchFamily="18" charset="0"/>
-            </a:endParaRPr>
+              <a:t>Which results in shorter wait times: cashier or self-checkout?</a:t>
+            </a:r>
           </a:p>
         </p:txBody>
       </p:sp>
@@ -5744,10 +5703,6 @@
               </a:rPr>
               <a:t>Since there are multiple combinations of self-checkout and cashier kiosks, we can’t do a paired t-test. Instead, we will run the simulation for a “week” with each combination—the one with the best wait and service times is the optimal combination </a:t>
             </a:r>
-            <a:endParaRPr lang="en-US" dirty="0" smtClean="0">
-              <a:latin typeface="Cambria Math" panose="02040503050406030204" pitchFamily="18" charset="0"/>
-              <a:ea typeface="Cambria Math" panose="02040503050406030204" pitchFamily="18" charset="0"/>
-            </a:endParaRPr>
           </a:p>
         </p:txBody>
       </p:sp>
@@ -5782,28 +5737,7 @@
                 <a:latin typeface="Cambria Math" panose="02040503050406030204" pitchFamily="18" charset="0"/>
                 <a:ea typeface="Cambria Math" panose="02040503050406030204" pitchFamily="18" charset="0"/>
               </a:rPr>
-              <a:t>2.   What is the </a:t>
-            </a:r>
-            <a:r>
-              <a:rPr lang="en-US" i="1" dirty="0" smtClean="0">
-                <a:latin typeface="Cambria Math" panose="02040503050406030204" pitchFamily="18" charset="0"/>
-                <a:ea typeface="Cambria Math" panose="02040503050406030204" pitchFamily="18" charset="0"/>
-              </a:rPr>
-              <a:t>optimal number of </a:t>
-            </a:r>
-            <a:r>
-              <a:rPr lang="en-US" i="1" dirty="0" smtClean="0">
-                <a:latin typeface="Cambria Math" panose="02040503050406030204" pitchFamily="18" charset="0"/>
-                <a:ea typeface="Cambria Math" panose="02040503050406030204" pitchFamily="18" charset="0"/>
-              </a:rPr>
-              <a:t>lanes  (of each type) to </a:t>
-            </a:r>
-            <a:r>
-              <a:rPr lang="en-US" i="1" dirty="0" smtClean="0">
-                <a:latin typeface="Cambria Math" panose="02040503050406030204" pitchFamily="18" charset="0"/>
-                <a:ea typeface="Cambria Math" panose="02040503050406030204" pitchFamily="18" charset="0"/>
-              </a:rPr>
-              <a:t>have open on an average day?</a:t>
+              <a:t>2.   What is the optimal number of lanes  (of each type) to have open on an average day?</a:t>
             </a:r>
           </a:p>
         </p:txBody>
@@ -5840,19 +5774,8 @@
                 <a:latin typeface="Cambria Math" panose="02040503050406030204" pitchFamily="18" charset="0"/>
                 <a:ea typeface="Cambria Math" panose="02040503050406030204" pitchFamily="18" charset="0"/>
               </a:rPr>
-              <a:t>The pseudo-random arrival will be the same for different combinations of checkout stations. For </a:t>
-            </a:r>
-            <a:r>
-              <a:rPr lang="en-US" dirty="0" smtClean="0">
-                <a:latin typeface="Cambria Math" panose="02040503050406030204" pitchFamily="18" charset="0"/>
-                <a:ea typeface="Cambria Math" panose="02040503050406030204" pitchFamily="18" charset="0"/>
-              </a:rPr>
-              <a:t>this problem we run the simulation for a “week” once with one cashier, once with one self-checkout, and do a paired t-test on the resulting wait times.</a:t>
-            </a:r>
-            <a:endParaRPr lang="en-US" dirty="0" smtClean="0">
-              <a:latin typeface="Cambria Math" panose="02040503050406030204" pitchFamily="18" charset="0"/>
-              <a:ea typeface="Cambria Math" panose="02040503050406030204" pitchFamily="18" charset="0"/>
-            </a:endParaRPr>
+              <a:t>The pseudo-random arrival will be the same for different combinations of checkout stations. For this problem we run the simulation for a “week” once with one cashier, once with one self-checkout, and do a paired t-test on the resulting wait times.</a:t>
+            </a:r>
           </a:p>
         </p:txBody>
       </p:sp>
@@ -5949,14 +5872,7 @@
                 <a:latin typeface="Cambria Math" panose="02040503050406030204" pitchFamily="18" charset="0"/>
                 <a:ea typeface="Cambria Math" panose="02040503050406030204" pitchFamily="18" charset="0"/>
               </a:rPr>
-              <a:t>3.   How </a:t>
-            </a:r>
-            <a:r>
-              <a:rPr lang="en-US" i="1" dirty="0" smtClean="0">
-                <a:latin typeface="Cambria Math" panose="02040503050406030204" pitchFamily="18" charset="0"/>
-                <a:ea typeface="Cambria Math" panose="02040503050406030204" pitchFamily="18" charset="0"/>
-              </a:rPr>
-              <a:t>often does a customer at the self-service station require an employee’s help with a transaction?</a:t>
+              <a:t>3.   How often does a customer at the self-service station require an employee’s help with a transaction?</a:t>
             </a:r>
           </a:p>
         </p:txBody>
@@ -5993,33 +5909,8 @@
                 <a:latin typeface="Cambria Math" panose="02040503050406030204" pitchFamily="18" charset="0"/>
                 <a:ea typeface="Cambria Math" panose="02040503050406030204" pitchFamily="18" charset="0"/>
               </a:rPr>
-              <a:t>We can easily figure this out by running our </a:t>
-            </a:r>
-            <a:r>
-              <a:rPr lang="en-US" dirty="0" smtClean="0">
-                <a:latin typeface="Cambria Math" panose="02040503050406030204" pitchFamily="18" charset="0"/>
-                <a:ea typeface="Cambria Math" panose="02040503050406030204" pitchFamily="18" charset="0"/>
-              </a:rPr>
-              <a:t>simulation for several “days” </a:t>
-            </a:r>
-            <a:r>
-              <a:rPr lang="en-US" dirty="0" smtClean="0">
-                <a:latin typeface="Cambria Math" panose="02040503050406030204" pitchFamily="18" charset="0"/>
-                <a:ea typeface="Cambria Math" panose="02040503050406030204" pitchFamily="18" charset="0"/>
-              </a:rPr>
-              <a:t>and </a:t>
-            </a:r>
-            <a:r>
-              <a:rPr lang="en-US" dirty="0" smtClean="0">
-                <a:latin typeface="Cambria Math" panose="02040503050406030204" pitchFamily="18" charset="0"/>
-                <a:ea typeface="Cambria Math" panose="02040503050406030204" pitchFamily="18" charset="0"/>
-              </a:rPr>
-              <a:t>counting the average number of employee interactions/day</a:t>
-            </a:r>
-            <a:endParaRPr lang="en-US" dirty="0" smtClean="0">
-              <a:latin typeface="Cambria Math" panose="02040503050406030204" pitchFamily="18" charset="0"/>
-              <a:ea typeface="Cambria Math" panose="02040503050406030204" pitchFamily="18" charset="0"/>
-            </a:endParaRPr>
+              <a:t>We can easily figure this out by running our simulation for several “days” and counting the average number of employee interactions/day</a:t>
+            </a:r>
           </a:p>
         </p:txBody>
       </p:sp>

</xml_diff>

<commit_message>
Added Finalized Powerpoint Presentation
</commit_message>
<xml_diff>
--- a/1538_Powerpoint.pptx
+++ b/1538_Powerpoint.pptx
@@ -3607,6 +3607,13 @@
   <p:clrMapOvr>
     <a:masterClrMapping/>
   </p:clrMapOvr>
+  <p:timing>
+    <p:tnLst>
+      <p:par>
+        <p:cTn id="1" dur="indefinite" restart="never" nodeType="tmRoot"/>
+      </p:par>
+    </p:tnLst>
+  </p:timing>
 </p:sld>
 </file>
 
@@ -3847,6 +3854,13 @@
   <p:clrMapOvr>
     <a:masterClrMapping/>
   </p:clrMapOvr>
+  <p:timing>
+    <p:tnLst>
+      <p:par>
+        <p:cTn id="1" dur="indefinite" restart="never" nodeType="tmRoot"/>
+      </p:par>
+    </p:tnLst>
+  </p:timing>
 </p:sld>
 </file>
 
@@ -3973,6 +3987,13 @@
   <p:clrMapOvr>
     <a:masterClrMapping/>
   </p:clrMapOvr>
+  <p:timing>
+    <p:tnLst>
+      <p:par>
+        <p:cTn id="1" dur="indefinite" restart="never" nodeType="tmRoot"/>
+      </p:par>
+    </p:tnLst>
+  </p:timing>
 </p:sld>
 </file>
 
@@ -4103,6 +4124,13 @@
   <p:clrMapOvr>
     <a:masterClrMapping/>
   </p:clrMapOvr>
+  <p:timing>
+    <p:tnLst>
+      <p:par>
+        <p:cTn id="1" dur="indefinite" restart="never" nodeType="tmRoot"/>
+      </p:par>
+    </p:tnLst>
+  </p:timing>
 </p:sld>
 </file>
 
@@ -4157,6 +4185,195 @@
           </a:p>
         </p:txBody>
       </p:sp>
+      <p:sp>
+        <p:nvSpPr>
+          <p:cNvPr id="3" name="TextBox 2"/>
+          <p:cNvSpPr txBox="1"/>
+          <p:nvPr/>
+        </p:nvSpPr>
+        <p:spPr>
+          <a:xfrm>
+            <a:off x="677997" y="1007630"/>
+            <a:ext cx="10064143" cy="4247317"/>
+          </a:xfrm>
+          <a:prstGeom prst="rect">
+            <a:avLst/>
+          </a:prstGeom>
+          <a:noFill/>
+        </p:spPr>
+        <p:txBody>
+          <a:bodyPr wrap="square" rtlCol="0">
+            <a:spAutoFit/>
+          </a:bodyPr>
+          <a:lstStyle/>
+          <a:p>
+            <a:pPr marL="285750" indent="-285750">
+              <a:lnSpc>
+                <a:spcPct val="150000"/>
+              </a:lnSpc>
+              <a:buFont typeface="Arial" panose="020B0604020202020204" pitchFamily="34" charset="0"/>
+              <a:buChar char="•"/>
+            </a:pPr>
+            <a:r>
+              <a:rPr lang="en-US" smtClean="0">
+                <a:latin typeface="Cambria Math" panose="02040503050406030204" pitchFamily="18" charset="0"/>
+                <a:ea typeface="Cambria Math" panose="02040503050406030204" pitchFamily="18" charset="0"/>
+              </a:rPr>
+              <a:t>Overall, cashier checkout lines proved to be much more efficient</a:t>
+            </a:r>
+          </a:p>
+          <a:p>
+            <a:pPr marL="742950" lvl="1" indent="-285750">
+              <a:lnSpc>
+                <a:spcPct val="150000"/>
+              </a:lnSpc>
+              <a:buFont typeface="Arial" panose="020B0604020202020204" pitchFamily="34" charset="0"/>
+              <a:buChar char="•"/>
+            </a:pPr>
+            <a:r>
+              <a:rPr lang="en-US" smtClean="0">
+                <a:latin typeface="Cambria Math" panose="02040503050406030204" pitchFamily="18" charset="0"/>
+                <a:ea typeface="Cambria Math" panose="02040503050406030204" pitchFamily="18" charset="0"/>
+              </a:rPr>
+              <a:t>Some customers still prefer to have self-checkout</a:t>
+            </a:r>
+            <a:endParaRPr lang="en-US" smtClean="0">
+              <a:latin typeface="Cambria Math" panose="02040503050406030204" pitchFamily="18" charset="0"/>
+              <a:ea typeface="Cambria Math" panose="02040503050406030204" pitchFamily="18" charset="0"/>
+            </a:endParaRPr>
+          </a:p>
+          <a:p>
+            <a:pPr marL="742950" lvl="1" indent="-285750">
+              <a:lnSpc>
+                <a:spcPct val="150000"/>
+              </a:lnSpc>
+              <a:buFont typeface="Arial" panose="020B0604020202020204" pitchFamily="34" charset="0"/>
+              <a:buChar char="•"/>
+            </a:pPr>
+            <a:r>
+              <a:rPr lang="en-US" smtClean="0">
+                <a:latin typeface="Cambria Math" panose="02040503050406030204" pitchFamily="18" charset="0"/>
+                <a:ea typeface="Cambria Math" panose="02040503050406030204" pitchFamily="18" charset="0"/>
+              </a:rPr>
+              <a:t>The most efficient setup is to have mostly cashier-run lanes and a few self-checkout lanes</a:t>
+            </a:r>
+          </a:p>
+          <a:p>
+            <a:pPr marL="285750" indent="-285750">
+              <a:lnSpc>
+                <a:spcPct val="150000"/>
+              </a:lnSpc>
+              <a:buFont typeface="Arial" panose="020B0604020202020204" pitchFamily="34" charset="0"/>
+              <a:buChar char="•"/>
+            </a:pPr>
+            <a:r>
+              <a:rPr lang="en-US" smtClean="0">
+                <a:latin typeface="Cambria Math" panose="02040503050406030204" pitchFamily="18" charset="0"/>
+                <a:ea typeface="Cambria Math" panose="02040503050406030204" pitchFamily="18" charset="0"/>
+              </a:rPr>
+              <a:t>Giant Eagle has this setup already, so they’re doing a pretty good job</a:t>
+            </a:r>
+          </a:p>
+          <a:p>
+            <a:pPr marL="285750" indent="-285750">
+              <a:lnSpc>
+                <a:spcPct val="150000"/>
+              </a:lnSpc>
+              <a:buFont typeface="Arial" panose="020B0604020202020204" pitchFamily="34" charset="0"/>
+              <a:buChar char="•"/>
+            </a:pPr>
+            <a:r>
+              <a:rPr lang="en-US">
+                <a:latin typeface="Cambria Math" panose="02040503050406030204" pitchFamily="18" charset="0"/>
+                <a:ea typeface="Cambria Math" panose="02040503050406030204" pitchFamily="18" charset="0"/>
+              </a:rPr>
+              <a:t>A Giant Eagle advantage card is required at </a:t>
+            </a:r>
+            <a:r>
+              <a:rPr lang="en-US">
+                <a:latin typeface="Cambria Math" panose="02040503050406030204" pitchFamily="18" charset="0"/>
+                <a:ea typeface="Cambria Math" panose="02040503050406030204" pitchFamily="18" charset="0"/>
+              </a:rPr>
+              <a:t>self </a:t>
+            </a:r>
+            <a:r>
+              <a:rPr lang="en-US" smtClean="0">
+                <a:latin typeface="Cambria Math" panose="02040503050406030204" pitchFamily="18" charset="0"/>
+                <a:ea typeface="Cambria Math" panose="02040503050406030204" pitchFamily="18" charset="0"/>
+              </a:rPr>
+              <a:t>checkout</a:t>
+            </a:r>
+          </a:p>
+          <a:p>
+            <a:pPr marL="742950" lvl="1" indent="-285750">
+              <a:lnSpc>
+                <a:spcPct val="150000"/>
+              </a:lnSpc>
+              <a:buFont typeface="Arial" panose="020B0604020202020204" pitchFamily="34" charset="0"/>
+              <a:buChar char="•"/>
+            </a:pPr>
+            <a:r>
+              <a:rPr lang="en-US" smtClean="0">
+                <a:latin typeface="Cambria Math" panose="02040503050406030204" pitchFamily="18" charset="0"/>
+                <a:ea typeface="Cambria Math" panose="02040503050406030204" pitchFamily="18" charset="0"/>
+              </a:rPr>
+              <a:t>Many first-time customers don’t realize at first and try to checkout without a card, causing a delay in the system</a:t>
+            </a:r>
+            <a:endParaRPr lang="en-US" smtClean="0">
+              <a:latin typeface="Cambria Math" panose="02040503050406030204" pitchFamily="18" charset="0"/>
+              <a:ea typeface="Cambria Math" panose="02040503050406030204" pitchFamily="18" charset="0"/>
+            </a:endParaRPr>
+          </a:p>
+          <a:p>
+            <a:pPr marL="285750" indent="-285750">
+              <a:lnSpc>
+                <a:spcPct val="150000"/>
+              </a:lnSpc>
+              <a:buFont typeface="Arial" panose="020B0604020202020204" pitchFamily="34" charset="0"/>
+              <a:buChar char="•"/>
+            </a:pPr>
+            <a:r>
+              <a:rPr lang="en-US" smtClean="0">
+                <a:latin typeface="Cambria Math" panose="02040503050406030204" pitchFamily="18" charset="0"/>
+                <a:ea typeface="Cambria Math" panose="02040503050406030204" pitchFamily="18" charset="0"/>
+              </a:rPr>
+              <a:t>Customers take a long time to scan and bag their own items</a:t>
+            </a:r>
+          </a:p>
+          <a:p>
+            <a:pPr marL="742950" lvl="1" indent="-285750">
+              <a:lnSpc>
+                <a:spcPct val="150000"/>
+              </a:lnSpc>
+              <a:buFont typeface="Arial" panose="020B0604020202020204" pitchFamily="34" charset="0"/>
+              <a:buChar char="•"/>
+            </a:pPr>
+            <a:r>
+              <a:rPr lang="en-US" smtClean="0">
+                <a:latin typeface="Cambria Math" panose="02040503050406030204" pitchFamily="18" charset="0"/>
+                <a:ea typeface="Cambria Math" panose="02040503050406030204" pitchFamily="18" charset="0"/>
+              </a:rPr>
+              <a:t>Making it easier for the customer to go through self-checkout could help a lot</a:t>
+            </a:r>
+          </a:p>
+          <a:p>
+            <a:pPr marL="742950" lvl="1" indent="-285750">
+              <a:lnSpc>
+                <a:spcPct val="150000"/>
+              </a:lnSpc>
+              <a:buFont typeface="Arial" panose="020B0604020202020204" pitchFamily="34" charset="0"/>
+              <a:buChar char="•"/>
+            </a:pPr>
+            <a:r>
+              <a:rPr lang="en-US" smtClean="0">
+                <a:latin typeface="Cambria Math" panose="02040503050406030204" pitchFamily="18" charset="0"/>
+                <a:ea typeface="Cambria Math" panose="02040503050406030204" pitchFamily="18" charset="0"/>
+              </a:rPr>
+              <a:t>This could be done by making the software easier to understand for first-time users</a:t>
+            </a:r>
+          </a:p>
+        </p:txBody>
+      </p:sp>
     </p:spTree>
     <p:extLst>
       <p:ext uri="{BB962C8B-B14F-4D97-AF65-F5344CB8AC3E}">
@@ -4167,6 +4384,13 @@
   <p:clrMapOvr>
     <a:masterClrMapping/>
   </p:clrMapOvr>
+  <p:timing>
+    <p:tnLst>
+      <p:par>
+        <p:cTn id="1" dur="indefinite" restart="never" nodeType="tmRoot"/>
+      </p:par>
+    </p:tnLst>
+  </p:timing>
 </p:sld>
 </file>
 
@@ -4400,7 +4624,7 @@
         </p:nvSpPr>
         <p:spPr>
           <a:xfrm>
-            <a:off x="503454" y="4624685"/>
+            <a:off x="503454" y="4532919"/>
             <a:ext cx="10477586" cy="1015663"/>
           </a:xfrm>
           <a:prstGeom prst="rect">
@@ -4459,6 +4683,13 @@
   <p:clrMapOvr>
     <a:masterClrMapping/>
   </p:clrMapOvr>
+  <p:timing>
+    <p:tnLst>
+      <p:par>
+        <p:cTn id="1" dur="indefinite" restart="never" nodeType="tmRoot"/>
+      </p:par>
+    </p:tnLst>
+  </p:timing>
 </p:sld>
 </file>
 
@@ -4578,13 +4809,20 @@
                 <a:latin typeface="Cambria Math" panose="02040503050406030204" pitchFamily="18" charset="0"/>
                 <a:ea typeface="Cambria Math" panose="02040503050406030204" pitchFamily="18" charset="0"/>
               </a:rPr>
-              <a:t>What are the optimal number of lanes to have open on an average day?</a:t>
+              <a:t>What are the optimal number of lanes to have open on an average </a:t>
+            </a:r>
+            <a:r>
+              <a:rPr lang="en-US" smtClean="0">
+                <a:latin typeface="Cambria Math" panose="02040503050406030204" pitchFamily="18" charset="0"/>
+                <a:ea typeface="Cambria Math" panose="02040503050406030204" pitchFamily="18" charset="0"/>
+              </a:rPr>
+              <a:t>day?</a:t>
             </a:r>
           </a:p>
           <a:p>
             <a:pPr lvl="1"/>
             <a:r>
-              <a:rPr lang="en-US" i="1" dirty="0" smtClean="0">
+              <a:rPr lang="en-US" i="1" smtClean="0">
                 <a:latin typeface="Cambria Math" panose="02040503050406030204" pitchFamily="18" charset="0"/>
                 <a:ea typeface="Cambria Math" panose="02040503050406030204" pitchFamily="18" charset="0"/>
               </a:rPr>
@@ -4599,10 +4837,11 @@
           </a:p>
           <a:p>
             <a:pPr marL="342900" indent="-342900">
-              <a:buAutoNum type="arabicPeriod"/>
+              <a:buFont typeface="+mj-lt"/>
+              <a:buAutoNum type="arabicPeriod" startAt="3"/>
             </a:pPr>
             <a:r>
-              <a:rPr lang="en-US" dirty="0" smtClean="0">
+              <a:rPr lang="en-US" smtClean="0">
                 <a:latin typeface="Cambria Math" panose="02040503050406030204" pitchFamily="18" charset="0"/>
                 <a:ea typeface="Cambria Math" panose="02040503050406030204" pitchFamily="18" charset="0"/>
               </a:rPr>
@@ -4612,7 +4851,7 @@
           <a:p>
             <a:pPr lvl="1"/>
             <a:r>
-              <a:rPr lang="en-US" i="1" dirty="0" smtClean="0">
+              <a:rPr lang="en-US" i="1" smtClean="0">
                 <a:latin typeface="Cambria Math" panose="02040503050406030204" pitchFamily="18" charset="0"/>
                 <a:ea typeface="Cambria Math" panose="02040503050406030204" pitchFamily="18" charset="0"/>
               </a:rPr>
@@ -4635,6 +4874,13 @@
   <p:clrMapOvr>
     <a:masterClrMapping/>
   </p:clrMapOvr>
+  <p:timing>
+    <p:tnLst>
+      <p:par>
+        <p:cTn id="1" dur="indefinite" restart="never" nodeType="tmRoot"/>
+      </p:par>
+    </p:tnLst>
+  </p:timing>
 </p:sld>
 </file>
 
@@ -5167,6 +5413,13 @@
   <p:clrMapOvr>
     <a:masterClrMapping/>
   </p:clrMapOvr>
+  <p:timing>
+    <p:tnLst>
+      <p:par>
+        <p:cTn id="1" dur="indefinite" restart="never" nodeType="tmRoot"/>
+      </p:par>
+    </p:tnLst>
+  </p:timing>
 </p:sld>
 </file>
 
@@ -5487,6 +5740,13 @@
   <p:clrMapOvr>
     <a:masterClrMapping/>
   </p:clrMapOvr>
+  <p:timing>
+    <p:tnLst>
+      <p:par>
+        <p:cTn id="1" dur="indefinite" restart="never" nodeType="tmRoot"/>
+      </p:par>
+    </p:tnLst>
+  </p:timing>
 </p:sld>
 </file>
 
@@ -5766,6 +6026,13 @@
   <p:clrMapOvr>
     <a:masterClrMapping/>
   </p:clrMapOvr>
+  <p:timing>
+    <p:tnLst>
+      <p:par>
+        <p:cTn id="1" dur="indefinite" restart="never" nodeType="tmRoot"/>
+      </p:par>
+    </p:tnLst>
+  </p:timing>
 </p:sld>
 </file>
 
@@ -5958,6 +6225,13 @@
   <p:clrMapOvr>
     <a:masterClrMapping/>
   </p:clrMapOvr>
+  <p:timing>
+    <p:tnLst>
+      <p:par>
+        <p:cTn id="1" dur="indefinite" restart="never" nodeType="tmRoot"/>
+      </p:par>
+    </p:tnLst>
+  </p:timing>
 </p:sld>
 </file>
 
@@ -6173,6 +6447,13 @@
   <p:clrMapOvr>
     <a:masterClrMapping/>
   </p:clrMapOvr>
+  <p:timing>
+    <p:tnLst>
+      <p:par>
+        <p:cTn id="1" dur="indefinite" restart="never" nodeType="tmRoot"/>
+      </p:par>
+    </p:tnLst>
+  </p:timing>
 </p:sld>
 </file>
 
@@ -6370,6 +6651,13 @@
   <p:clrMapOvr>
     <a:masterClrMapping/>
   </p:clrMapOvr>
+  <p:timing>
+    <p:tnLst>
+      <p:par>
+        <p:cTn id="1" dur="indefinite" restart="never" nodeType="tmRoot"/>
+      </p:par>
+    </p:tnLst>
+  </p:timing>
 </p:sld>
 </file>
 

</xml_diff>